<commit_message>
revise ch1&2 level of measurement
</commit_message>
<xml_diff>
--- a/Lecture 1- Introduction to Psychological Measurement and Data Analysis/Lecture 1- Introduction to Psychological Measurement and Data Analysis.pptx
+++ b/Lecture 1- Introduction to Psychological Measurement and Data Analysis/Lecture 1- Introduction to Psychological Measurement and Data Analysis.pptx
@@ -5,10 +5,10 @@
     <p:sldMasterId id="2147483648" r:id="rId1"/>
   </p:sldMasterIdLst>
   <p:notesMasterIdLst>
-    <p:notesMasterId r:id="rId37"/>
+    <p:notesMasterId r:id="rId44"/>
   </p:notesMasterIdLst>
   <p:handoutMasterIdLst>
-    <p:handoutMasterId r:id="rId38"/>
+    <p:handoutMasterId r:id="rId45"/>
   </p:handoutMasterIdLst>
   <p:sldIdLst>
     <p:sldId id="256" r:id="rId2"/>
@@ -44,8 +44,15 @@
     <p:sldId id="334" r:id="rId32"/>
     <p:sldId id="366" r:id="rId33"/>
     <p:sldId id="261" r:id="rId34"/>
-    <p:sldId id="367" r:id="rId35"/>
-    <p:sldId id="335" r:id="rId36"/>
+    <p:sldId id="380" r:id="rId35"/>
+    <p:sldId id="381" r:id="rId36"/>
+    <p:sldId id="382" r:id="rId37"/>
+    <p:sldId id="383" r:id="rId38"/>
+    <p:sldId id="367" r:id="rId39"/>
+    <p:sldId id="384" r:id="rId40"/>
+    <p:sldId id="385" r:id="rId41"/>
+    <p:sldId id="386" r:id="rId42"/>
+    <p:sldId id="335" r:id="rId43"/>
   </p:sldIdLst>
   <p:sldSz cx="9144000" cy="6858000" type="screen4x3"/>
   <p:notesSz cx="7315200" cy="9601200"/>
@@ -246,7 +253,7 @@
             <a:fld id="{990F7567-D132-4541-A577-229F9DF73CF5}" type="datetimeFigureOut">
               <a:rPr lang="en-US" smtClean="0"/>
               <a:pPr/>
-              <a:t>1/13/18</a:t>
+              <a:t>1/25/18</a:t>
             </a:fld>
             <a:endParaRPr lang="en-US"/>
           </a:p>
@@ -413,7 +420,7 @@
             <a:fld id="{350B40B2-52CC-4C41-A80D-3DE4C1156FAC}" type="datetimeFigureOut">
               <a:rPr lang="en-US" smtClean="0"/>
               <a:pPr/>
-              <a:t>1/13/18</a:t>
+              <a:t>1/25/18</a:t>
             </a:fld>
             <a:endParaRPr lang="en-US"/>
           </a:p>
@@ -2530,7 +2537,42 @@
           <a:bodyPr/>
           <a:lstStyle/>
           <a:p>
-            <a:endParaRPr lang="en-US"/>
+            <a:r>
+              <a:rPr lang="en-US" dirty="0"/>
+              <a:t>http://</a:t>
+            </a:r>
+            <a:r>
+              <a:rPr lang="en-US" dirty="0" err="1"/>
+              <a:t>www.psychology.emory.edu</a:t>
+            </a:r>
+            <a:r>
+              <a:rPr lang="en-US" dirty="0"/>
+              <a:t>/clinical/</a:t>
+            </a:r>
+            <a:r>
+              <a:rPr lang="en-US" dirty="0" err="1"/>
+              <a:t>bliwise</a:t>
+            </a:r>
+            <a:r>
+              <a:rPr lang="en-US" dirty="0"/>
+              <a:t>/Tutorials/SOM/</a:t>
+            </a:r>
+            <a:r>
+              <a:rPr lang="en-US" dirty="0" err="1"/>
+              <a:t>smmod</a:t>
+            </a:r>
+            <a:r>
+              <a:rPr lang="en-US" dirty="0"/>
+              <a:t>/</a:t>
+            </a:r>
+            <a:r>
+              <a:rPr lang="en-US" dirty="0" err="1"/>
+              <a:t>scalemea</a:t>
+            </a:r>
+            <a:r>
+              <a:rPr lang="en-US" dirty="0"/>
+              <a:t>/print2.htm</a:t>
+            </a:r>
           </a:p>
         </p:txBody>
       </p:sp>
@@ -2549,9 +2591,8 @@
           <a:bodyPr/>
           <a:lstStyle/>
           <a:p>
-            <a:fld id="{259D6929-1D84-4AC5-8E58-AEAC9F451A26}" type="slidenum">
+            <a:fld id="{7D7E8EA2-DBBE-4FAE-BE62-C13A9D37EC47}" type="slidenum">
               <a:rPr lang="en-US" smtClean="0"/>
-              <a:pPr/>
               <a:t>34</a:t>
             </a:fld>
             <a:endParaRPr lang="en-US"/>
@@ -2561,7 +2602,7 @@
     </p:spTree>
     <p:extLst>
       <p:ext uri="{BB962C8B-B14F-4D97-AF65-F5344CB8AC3E}">
-        <p14:creationId xmlns:p14="http://schemas.microsoft.com/office/powerpoint/2010/main" val="2415049103"/>
+        <p14:creationId xmlns:p14="http://schemas.microsoft.com/office/powerpoint/2010/main" val="937551579"/>
       </p:ext>
     </p:extLst>
   </p:cSld>
@@ -2722,7 +2763,187 @@
             <a:fld id="{259D6929-1D84-4AC5-8E58-AEAC9F451A26}" type="slidenum">
               <a:rPr lang="en-US" smtClean="0"/>
               <a:pPr/>
-              <a:t>35</a:t>
+              <a:t>38</a:t>
+            </a:fld>
+            <a:endParaRPr lang="en-US"/>
+          </a:p>
+        </p:txBody>
+      </p:sp>
+    </p:spTree>
+    <p:extLst>
+      <p:ext uri="{BB962C8B-B14F-4D97-AF65-F5344CB8AC3E}">
+        <p14:creationId xmlns:p14="http://schemas.microsoft.com/office/powerpoint/2010/main" val="2415049103"/>
+      </p:ext>
+    </p:extLst>
+  </p:cSld>
+  <p:clrMapOvr>
+    <a:masterClrMapping/>
+  </p:clrMapOvr>
+</p:notes>
+</file>
+
+<file path=ppt/notesSlides/notesSlide31.xml><?xml version="1.0" encoding="utf-8"?>
+<p:notes xmlns:a="http://schemas.openxmlformats.org/drawingml/2006/main" xmlns:r="http://schemas.openxmlformats.org/officeDocument/2006/relationships" xmlns:p="http://schemas.openxmlformats.org/presentationml/2006/main">
+  <p:cSld>
+    <p:spTree>
+      <p:nvGrpSpPr>
+        <p:cNvPr id="1" name=""/>
+        <p:cNvGrpSpPr/>
+        <p:nvPr/>
+      </p:nvGrpSpPr>
+      <p:grpSpPr>
+        <a:xfrm>
+          <a:off x="0" y="0"/>
+          <a:ext cx="0" cy="0"/>
+          <a:chOff x="0" y="0"/>
+          <a:chExt cx="0" cy="0"/>
+        </a:xfrm>
+      </p:grpSpPr>
+      <p:sp>
+        <p:nvSpPr>
+          <p:cNvPr id="2" name="Slide Image Placeholder 1"/>
+          <p:cNvSpPr>
+            <a:spLocks noGrp="1" noRot="1" noChangeAspect="1"/>
+          </p:cNvSpPr>
+          <p:nvPr>
+            <p:ph type="sldImg"/>
+          </p:nvPr>
+        </p:nvSpPr>
+        <p:spPr/>
+      </p:sp>
+      <p:sp>
+        <p:nvSpPr>
+          <p:cNvPr id="3" name="Notes Placeholder 2"/>
+          <p:cNvSpPr>
+            <a:spLocks noGrp="1"/>
+          </p:cNvSpPr>
+          <p:nvPr>
+            <p:ph type="body" idx="1"/>
+          </p:nvPr>
+        </p:nvSpPr>
+        <p:spPr/>
+        <p:txBody>
+          <a:bodyPr/>
+          <a:lstStyle/>
+          <a:p>
+            <a:r>
+              <a:rPr lang="en-US" dirty="0"/>
+              <a:t>http://</a:t>
+            </a:r>
+            <a:r>
+              <a:rPr lang="en-US" dirty="0" err="1"/>
+              <a:t>www.mymarketresearchmethods.com</a:t>
+            </a:r>
+            <a:r>
+              <a:rPr lang="en-US" dirty="0"/>
+              <a:t>/types-of-data-nominal-ordinal-interval-ratio/</a:t>
+            </a:r>
+          </a:p>
+        </p:txBody>
+      </p:sp>
+      <p:sp>
+        <p:nvSpPr>
+          <p:cNvPr id="4" name="Slide Number Placeholder 3"/>
+          <p:cNvSpPr>
+            <a:spLocks noGrp="1"/>
+          </p:cNvSpPr>
+          <p:nvPr>
+            <p:ph type="sldNum" sz="quarter" idx="10"/>
+          </p:nvPr>
+        </p:nvSpPr>
+        <p:spPr/>
+        <p:txBody>
+          <a:bodyPr/>
+          <a:lstStyle/>
+          <a:p>
+            <a:fld id="{7D7E8EA2-DBBE-4FAE-BE62-C13A9D37EC47}" type="slidenum">
+              <a:rPr lang="en-US" smtClean="0"/>
+              <a:t>41</a:t>
+            </a:fld>
+            <a:endParaRPr lang="en-US"/>
+          </a:p>
+        </p:txBody>
+      </p:sp>
+    </p:spTree>
+    <p:extLst>
+      <p:ext uri="{BB962C8B-B14F-4D97-AF65-F5344CB8AC3E}">
+        <p14:creationId xmlns:p14="http://schemas.microsoft.com/office/powerpoint/2010/main" val="998327436"/>
+      </p:ext>
+    </p:extLst>
+  </p:cSld>
+  <p:clrMapOvr>
+    <a:masterClrMapping/>
+  </p:clrMapOvr>
+</p:notes>
+</file>
+
+<file path=ppt/notesSlides/notesSlide32.xml><?xml version="1.0" encoding="utf-8"?>
+<p:notes xmlns:a="http://schemas.openxmlformats.org/drawingml/2006/main" xmlns:r="http://schemas.openxmlformats.org/officeDocument/2006/relationships" xmlns:p="http://schemas.openxmlformats.org/presentationml/2006/main">
+  <p:cSld>
+    <p:spTree>
+      <p:nvGrpSpPr>
+        <p:cNvPr id="1" name=""/>
+        <p:cNvGrpSpPr/>
+        <p:nvPr/>
+      </p:nvGrpSpPr>
+      <p:grpSpPr>
+        <a:xfrm>
+          <a:off x="0" y="0"/>
+          <a:ext cx="0" cy="0"/>
+          <a:chOff x="0" y="0"/>
+          <a:chExt cx="0" cy="0"/>
+        </a:xfrm>
+      </p:grpSpPr>
+      <p:sp>
+        <p:nvSpPr>
+          <p:cNvPr id="2" name="Slide Image Placeholder 1"/>
+          <p:cNvSpPr>
+            <a:spLocks noGrp="1" noRot="1" noChangeAspect="1"/>
+          </p:cNvSpPr>
+          <p:nvPr>
+            <p:ph type="sldImg"/>
+          </p:nvPr>
+        </p:nvSpPr>
+        <p:spPr/>
+      </p:sp>
+      <p:sp>
+        <p:nvSpPr>
+          <p:cNvPr id="3" name="Notes Placeholder 2"/>
+          <p:cNvSpPr>
+            <a:spLocks noGrp="1"/>
+          </p:cNvSpPr>
+          <p:nvPr>
+            <p:ph type="body" idx="1"/>
+          </p:nvPr>
+        </p:nvSpPr>
+        <p:spPr/>
+        <p:txBody>
+          <a:bodyPr/>
+          <a:lstStyle/>
+          <a:p>
+            <a:endParaRPr lang="en-US"/>
+          </a:p>
+        </p:txBody>
+      </p:sp>
+      <p:sp>
+        <p:nvSpPr>
+          <p:cNvPr id="4" name="Slide Number Placeholder 3"/>
+          <p:cNvSpPr>
+            <a:spLocks noGrp="1"/>
+          </p:cNvSpPr>
+          <p:nvPr>
+            <p:ph type="sldNum" sz="quarter" idx="10"/>
+          </p:nvPr>
+        </p:nvSpPr>
+        <p:spPr/>
+        <p:txBody>
+          <a:bodyPr/>
+          <a:lstStyle/>
+          <a:p>
+            <a:fld id="{259D6929-1D84-4AC5-8E58-AEAC9F451A26}" type="slidenum">
+              <a:rPr lang="en-US" smtClean="0"/>
+              <a:pPr/>
+              <a:t>42</a:t>
             </a:fld>
             <a:endParaRPr lang="en-US"/>
           </a:p>
@@ -3402,7 +3623,7 @@
           <a:p>
             <a:fld id="{1C5EE64F-D62A-4841-9CF6-23634660A912}" type="datetime1">
               <a:rPr lang="en-US" smtClean="0"/>
-              <a:t>1/13/18</a:t>
+              <a:t>1/25/18</a:t>
             </a:fld>
             <a:endParaRPr lang="en-US"/>
           </a:p>
@@ -3566,7 +3787,7 @@
           <a:p>
             <a:fld id="{F8A78725-05B2-40C4-B016-54DE05034EA9}" type="datetime1">
               <a:rPr lang="en-US" smtClean="0"/>
-              <a:t>1/13/18</a:t>
+              <a:t>1/25/18</a:t>
             </a:fld>
             <a:endParaRPr lang="en-US"/>
           </a:p>
@@ -3740,7 +3961,7 @@
           <a:p>
             <a:fld id="{487F349B-455A-4BBA-9CDD-BAC1FD2B1795}" type="datetime1">
               <a:rPr lang="en-US" smtClean="0"/>
-              <a:t>1/13/18</a:t>
+              <a:t>1/25/18</a:t>
             </a:fld>
             <a:endParaRPr lang="en-US"/>
           </a:p>
@@ -3904,7 +4125,7 @@
           <a:p>
             <a:fld id="{F2731259-9404-49AB-A5D6-20C5260F6D85}" type="datetime1">
               <a:rPr lang="en-US" smtClean="0"/>
-              <a:t>1/13/18</a:t>
+              <a:t>1/25/18</a:t>
             </a:fld>
             <a:endParaRPr lang="en-US"/>
           </a:p>
@@ -4145,7 +4366,7 @@
           <a:p>
             <a:fld id="{2CDB6668-36B2-4024-8689-BE86B826E967}" type="datetime1">
               <a:rPr lang="en-US" smtClean="0"/>
-              <a:t>1/13/18</a:t>
+              <a:t>1/25/18</a:t>
             </a:fld>
             <a:endParaRPr lang="en-US"/>
           </a:p>
@@ -4426,7 +4647,7 @@
           <a:p>
             <a:fld id="{041DB3AF-EE56-4836-9F04-0380C5778F9A}" type="datetime1">
               <a:rPr lang="en-US" smtClean="0"/>
-              <a:t>1/13/18</a:t>
+              <a:t>1/25/18</a:t>
             </a:fld>
             <a:endParaRPr lang="en-US"/>
           </a:p>
@@ -4841,7 +5062,7 @@
           <a:p>
             <a:fld id="{856F7422-65E6-402C-A2EA-59437638CA55}" type="datetime1">
               <a:rPr lang="en-US" smtClean="0"/>
-              <a:t>1/13/18</a:t>
+              <a:t>1/25/18</a:t>
             </a:fld>
             <a:endParaRPr lang="en-US"/>
           </a:p>
@@ -4954,7 +5175,7 @@
           <a:p>
             <a:fld id="{6B3E5D6F-4295-49E3-90F2-25EA0E655E8B}" type="datetime1">
               <a:rPr lang="en-US" smtClean="0"/>
-              <a:t>1/13/18</a:t>
+              <a:t>1/25/18</a:t>
             </a:fld>
             <a:endParaRPr lang="en-US"/>
           </a:p>
@@ -5045,7 +5266,7 @@
           <a:p>
             <a:fld id="{89596AA3-A293-4B1F-BF70-7E2134136A5E}" type="datetime1">
               <a:rPr lang="en-US" smtClean="0"/>
-              <a:t>1/13/18</a:t>
+              <a:t>1/25/18</a:t>
             </a:fld>
             <a:endParaRPr lang="en-US"/>
           </a:p>
@@ -5316,7 +5537,7 @@
           <a:p>
             <a:fld id="{76929F5A-F834-4C50-913B-79ED1C7FC5CA}" type="datetime1">
               <a:rPr lang="en-US" smtClean="0"/>
-              <a:t>1/13/18</a:t>
+              <a:t>1/25/18</a:t>
             </a:fld>
             <a:endParaRPr lang="en-US"/>
           </a:p>
@@ -5564,7 +5785,7 @@
           <a:p>
             <a:fld id="{1C233412-A9F2-41CB-98CE-F8A4268AEE40}" type="datetime1">
               <a:rPr lang="en-US" smtClean="0"/>
-              <a:t>1/13/18</a:t>
+              <a:t>1/25/18</a:t>
             </a:fld>
             <a:endParaRPr lang="en-US"/>
           </a:p>
@@ -5771,7 +5992,7 @@
           <a:p>
             <a:fld id="{B39FFA86-6097-41D7-9F1C-853CCB815E7F}" type="datetime1">
               <a:rPr lang="en-US" smtClean="0"/>
-              <a:t>1/13/18</a:t>
+              <a:t>1/25/18</a:t>
             </a:fld>
             <a:endParaRPr lang="en-US"/>
           </a:p>
@@ -13962,147 +14183,50 @@
         </p:nvSpPr>
         <p:spPr/>
         <p:txBody>
-          <a:bodyPr>
-            <a:normAutofit fontScale="90000"/>
-          </a:bodyPr>
-          <a:lstStyle/>
-          <a:p>
-            <a:r>
-              <a:rPr lang="en-US" b="1" dirty="0">
-                <a:solidFill>
-                  <a:srgbClr val="000099"/>
-                </a:solidFill>
-                <a:latin typeface="Palatino Linotype" pitchFamily="18" charset="0"/>
-                <a:ea typeface="Cambria Math" pitchFamily="18" charset="0"/>
-              </a:rPr>
-              <a:t>Scales (Levels) of Measurement</a:t>
-            </a:r>
-            <a:endParaRPr lang="en-US" dirty="0"/>
-          </a:p>
-        </p:txBody>
-      </p:sp>
-      <p:sp>
-        <p:nvSpPr>
-          <p:cNvPr id="3" name="Content Placeholder 2"/>
-          <p:cNvSpPr>
-            <a:spLocks noGrp="1"/>
-          </p:cNvSpPr>
-          <p:nvPr>
-            <p:ph idx="1"/>
-          </p:nvPr>
-        </p:nvSpPr>
-        <p:spPr/>
-        <p:txBody>
           <a:bodyPr/>
           <a:lstStyle/>
           <a:p>
             <a:r>
-              <a:rPr lang="en-US" dirty="0">
-                <a:latin typeface="Palatino Linotype" pitchFamily="18" charset="0"/>
-                <a:ea typeface="Cambria Math" pitchFamily="18" charset="0"/>
-                <a:cs typeface="Times New Roman" pitchFamily="18" charset="0"/>
-              </a:rPr>
-              <a:t>Ratio</a:t>
-            </a:r>
-          </a:p>
-          <a:p>
-            <a:pPr lvl="1"/>
-            <a:r>
-              <a:rPr lang="en-US" dirty="0">
-                <a:latin typeface="Palatino Linotype" pitchFamily="18" charset="0"/>
-                <a:ea typeface="Cambria Math" pitchFamily="18" charset="0"/>
-                <a:cs typeface="Times New Roman" pitchFamily="18" charset="0"/>
-              </a:rPr>
-              <a:t>Continuous – </a:t>
-            </a:r>
-            <a:r>
-              <a:rPr lang="en-US" i="1" dirty="0">
-                <a:latin typeface="Palatino Linotype" pitchFamily="18" charset="0"/>
-                <a:ea typeface="Cambria Math" pitchFamily="18" charset="0"/>
-                <a:cs typeface="Times New Roman" pitchFamily="18" charset="0"/>
-              </a:rPr>
-              <a:t>Properties of an interval scale plus</a:t>
-            </a:r>
-          </a:p>
-          <a:p>
-            <a:pPr lvl="1"/>
-            <a:r>
-              <a:rPr lang="en-US" dirty="0">
-                <a:latin typeface="Palatino Linotype" pitchFamily="18" charset="0"/>
-                <a:ea typeface="Cambria Math" pitchFamily="18" charset="0"/>
-                <a:cs typeface="Times New Roman" pitchFamily="18" charset="0"/>
-              </a:rPr>
-              <a:t>Can compare ratios of scores at any location</a:t>
-            </a:r>
-          </a:p>
-          <a:p>
-            <a:pPr lvl="1"/>
-            <a:r>
-              <a:rPr lang="en-US" dirty="0">
-                <a:latin typeface="Palatino Linotype" pitchFamily="18" charset="0"/>
-                <a:ea typeface="Cambria Math" pitchFamily="18" charset="0"/>
-                <a:cs typeface="Times New Roman" pitchFamily="18" charset="0"/>
-              </a:rPr>
-              <a:t>Has a legitimate zero point</a:t>
-            </a:r>
-          </a:p>
-          <a:p>
-            <a:pPr lvl="2"/>
-            <a:r>
-              <a:rPr lang="en-US" dirty="0">
-                <a:latin typeface="Palatino Linotype" pitchFamily="18" charset="0"/>
-                <a:ea typeface="Cambria Math" pitchFamily="18" charset="0"/>
-                <a:cs typeface="Times New Roman" pitchFamily="18" charset="0"/>
-              </a:rPr>
-              <a:t>Examples: weight, height(zero is the beginning point  of the ruler, yardstick, or tape measure), days absent </a:t>
-            </a:r>
-            <a:r>
-              <a:rPr lang="en-US">
-                <a:latin typeface="Palatino Linotype" pitchFamily="18" charset="0"/>
-                <a:ea typeface="Cambria Math" pitchFamily="18" charset="0"/>
-                <a:cs typeface="Times New Roman" pitchFamily="18" charset="0"/>
-              </a:rPr>
-              <a:t>from work</a:t>
-            </a:r>
-            <a:endParaRPr lang="en-US" dirty="0">
-              <a:latin typeface="Palatino Linotype" pitchFamily="18" charset="0"/>
-              <a:ea typeface="Cambria Math" pitchFamily="18" charset="0"/>
-              <a:cs typeface="Times New Roman" pitchFamily="18" charset="0"/>
-            </a:endParaRPr>
-          </a:p>
-          <a:p>
-            <a:endParaRPr lang="en-US" dirty="0"/>
-          </a:p>
-        </p:txBody>
-      </p:sp>
-      <p:sp>
-        <p:nvSpPr>
-          <p:cNvPr id="4" name="Slide Number Placeholder 3"/>
-          <p:cNvSpPr>
-            <a:spLocks noGrp="1"/>
-          </p:cNvSpPr>
-          <p:nvPr>
-            <p:ph type="sldNum" sz="quarter" idx="12"/>
-          </p:nvPr>
-        </p:nvSpPr>
-        <p:spPr/>
-        <p:txBody>
-          <a:bodyPr/>
-          <a:lstStyle/>
-          <a:p>
-            <a:fld id="{DF25E0C8-8CAD-4BA8-80F3-7765EFC7DE86}" type="slidenum">
-              <a:rPr lang="en-US" smtClean="0"/>
-              <a:pPr/>
-              <a:t>34</a:t>
-            </a:fld>
-            <a:endParaRPr lang="en-US"/>
-          </a:p>
-        </p:txBody>
-      </p:sp>
+              <a:rPr lang="en-US" dirty="0"/>
+              <a:t>Level of Measurement</a:t>
+            </a:r>
+          </a:p>
+        </p:txBody>
+      </p:sp>
+      <p:pic>
+        <p:nvPicPr>
+          <p:cNvPr id="7" name="Picture 6" descr="Screen Shot 2018-01-25 at 10.00.46 AM.png"/>
+          <p:cNvPicPr>
+            <a:picLocks noChangeAspect="1"/>
+          </p:cNvPicPr>
+          <p:nvPr/>
+        </p:nvPicPr>
+        <p:blipFill>
+          <a:blip r:embed="rId3">
+            <a:extLst>
+              <a:ext uri="{28A0092B-C50C-407E-A947-70E740481C1C}">
+                <a14:useLocalDpi xmlns:a14="http://schemas.microsoft.com/office/drawing/2010/main" val="0"/>
+              </a:ext>
+            </a:extLst>
+          </a:blip>
+          <a:stretch>
+            <a:fillRect/>
+          </a:stretch>
+        </p:blipFill>
+        <p:spPr>
+          <a:xfrm>
+            <a:off x="533400" y="1371600"/>
+            <a:ext cx="8013700" cy="4902200"/>
+          </a:xfrm>
+          <a:prstGeom prst="rect">
+            <a:avLst/>
+          </a:prstGeom>
+        </p:spPr>
+      </p:pic>
     </p:spTree>
     <p:extLst>
       <p:ext uri="{BB962C8B-B14F-4D97-AF65-F5344CB8AC3E}">
-        <p14:creationId xmlns:p14="http://schemas.microsoft.com/office/powerpoint/2010/main" val="2264746144"/>
+        <p14:creationId xmlns:p14="http://schemas.microsoft.com/office/powerpoint/2010/main" val="1689515415"/>
       </p:ext>
     </p:extLst>
   </p:cSld>
@@ -14141,8 +14265,367 @@
         </p:nvSpPr>
         <p:spPr/>
         <p:txBody>
+          <a:bodyPr/>
+          <a:lstStyle/>
+          <a:p>
+            <a:r>
+              <a:rPr lang="en-US" dirty="0"/>
+              <a:t>Level of Measurement</a:t>
+            </a:r>
+          </a:p>
+        </p:txBody>
+      </p:sp>
+      <p:sp>
+        <p:nvSpPr>
+          <p:cNvPr id="3" name="Content Placeholder 2"/>
+          <p:cNvSpPr>
+            <a:spLocks noGrp="1"/>
+          </p:cNvSpPr>
+          <p:nvPr>
+            <p:ph idx="1"/>
+          </p:nvPr>
+        </p:nvSpPr>
+        <p:spPr/>
+        <p:txBody>
+          <a:bodyPr/>
+          <a:lstStyle/>
+          <a:p>
+            <a:r>
+              <a:rPr lang="en-US" dirty="0"/>
+              <a:t>Interval</a:t>
+            </a:r>
+            <a:r>
+              <a:rPr lang="zh-CN" altLang="en-US" dirty="0"/>
+              <a:t> </a:t>
+            </a:r>
+            <a:r>
+              <a:rPr lang="en-US" altLang="zh-CN" dirty="0"/>
+              <a:t>Scale:</a:t>
+            </a:r>
+          </a:p>
+          <a:p>
+            <a:pPr lvl="1"/>
+            <a:r>
+              <a:rPr lang="en-US" dirty="0"/>
+              <a:t>Example: Melissa has an SAT score of 1205, while Kevin has an SAT score of 1090. Melissa scored 115 points more than Kevin.</a:t>
+            </a:r>
+          </a:p>
+        </p:txBody>
+      </p:sp>
+      <p:sp>
+        <p:nvSpPr>
+          <p:cNvPr id="4" name="Rounded Rectangle 3"/>
+          <p:cNvSpPr/>
+          <p:nvPr/>
+        </p:nvSpPr>
+        <p:spPr>
+          <a:xfrm>
+            <a:off x="1219200" y="3657600"/>
+            <a:ext cx="6629400" cy="2362200"/>
+          </a:xfrm>
+          <a:prstGeom prst="roundRect">
+            <a:avLst/>
+          </a:prstGeom>
+        </p:spPr>
+        <p:style>
+          <a:lnRef idx="1">
+            <a:schemeClr val="accent1"/>
+          </a:lnRef>
+          <a:fillRef idx="3">
+            <a:schemeClr val="accent1"/>
+          </a:fillRef>
+          <a:effectRef idx="2">
+            <a:schemeClr val="accent1"/>
+          </a:effectRef>
+          <a:fontRef idx="minor">
+            <a:schemeClr val="lt1"/>
+          </a:fontRef>
+        </p:style>
+        <p:txBody>
+          <a:bodyPr rtlCol="0" anchor="ctr"/>
+          <a:lstStyle/>
+          <a:p>
+            <a:pPr algn="ctr"/>
+            <a:r>
+              <a:rPr lang="en-US" dirty="0"/>
+              <a:t>You can’t score ZERO on the SATs.</a:t>
+            </a:r>
+            <a:r>
+              <a:rPr lang="zh-CN" altLang="en-US" dirty="0"/>
+              <a:t> </a:t>
+            </a:r>
+            <a:r>
+              <a:rPr lang="en-US" dirty="0"/>
+              <a:t>If you sign your name, you get 200 points per section.</a:t>
+            </a:r>
+            <a:r>
+              <a:rPr lang="zh-CN" altLang="en-US" dirty="0"/>
+              <a:t> </a:t>
+            </a:r>
+            <a:r>
+              <a:rPr lang="en-US" dirty="0"/>
+              <a:t>Therefore, zero is arbitrary.</a:t>
+            </a:r>
+          </a:p>
+        </p:txBody>
+      </p:sp>
+    </p:spTree>
+    <p:extLst>
+      <p:ext uri="{BB962C8B-B14F-4D97-AF65-F5344CB8AC3E}">
+        <p14:creationId xmlns:p14="http://schemas.microsoft.com/office/powerpoint/2010/main" val="1783766981"/>
+      </p:ext>
+    </p:extLst>
+  </p:cSld>
+  <p:clrMapOvr>
+    <a:masterClrMapping/>
+  </p:clrMapOvr>
+</p:sld>
+</file>
+
+<file path=ppt/slides/slide36.xml><?xml version="1.0" encoding="utf-8"?>
+<p:sld xmlns:a="http://schemas.openxmlformats.org/drawingml/2006/main" xmlns:r="http://schemas.openxmlformats.org/officeDocument/2006/relationships" xmlns:p="http://schemas.openxmlformats.org/presentationml/2006/main">
+  <p:cSld>
+    <p:spTree>
+      <p:nvGrpSpPr>
+        <p:cNvPr id="1" name=""/>
+        <p:cNvGrpSpPr/>
+        <p:nvPr/>
+      </p:nvGrpSpPr>
+      <p:grpSpPr>
+        <a:xfrm>
+          <a:off x="0" y="0"/>
+          <a:ext cx="0" cy="0"/>
+          <a:chOff x="0" y="0"/>
+          <a:chExt cx="0" cy="0"/>
+        </a:xfrm>
+      </p:grpSpPr>
+      <p:sp>
+        <p:nvSpPr>
+          <p:cNvPr id="2" name="Title 1"/>
+          <p:cNvSpPr>
+            <a:spLocks noGrp="1"/>
+          </p:cNvSpPr>
+          <p:nvPr>
+            <p:ph type="title"/>
+          </p:nvPr>
+        </p:nvSpPr>
+        <p:spPr/>
+        <p:txBody>
+          <a:bodyPr/>
+          <a:lstStyle/>
+          <a:p>
+            <a:r>
+              <a:rPr lang="en-US" dirty="0"/>
+              <a:t>Level of Measurement</a:t>
+            </a:r>
+          </a:p>
+        </p:txBody>
+      </p:sp>
+      <p:sp>
+        <p:nvSpPr>
+          <p:cNvPr id="3" name="Content Placeholder 2"/>
+          <p:cNvSpPr>
+            <a:spLocks noGrp="1"/>
+          </p:cNvSpPr>
+          <p:nvPr>
+            <p:ph idx="1"/>
+          </p:nvPr>
+        </p:nvSpPr>
+        <p:spPr/>
+        <p:txBody>
+          <a:bodyPr/>
+          <a:lstStyle/>
+          <a:p>
+            <a:r>
+              <a:rPr lang="en-US" dirty="0"/>
+              <a:t>Interval</a:t>
+            </a:r>
+            <a:r>
+              <a:rPr lang="zh-CN" altLang="en-US" dirty="0"/>
+              <a:t> </a:t>
+            </a:r>
+            <a:r>
+              <a:rPr lang="en-US" altLang="zh-CN" dirty="0"/>
+              <a:t>Scale:</a:t>
+            </a:r>
+          </a:p>
+          <a:p>
+            <a:pPr lvl="1"/>
+            <a:r>
+              <a:rPr lang="en-US" dirty="0"/>
+              <a:t>Many of our standardized tests in psychology use interval scales. An IQ (Intelligence Quotient) score from a standardized test of intelligences is a good example of an interval scale score.</a:t>
+            </a:r>
+          </a:p>
+        </p:txBody>
+      </p:sp>
+    </p:spTree>
+    <p:extLst>
+      <p:ext uri="{BB962C8B-B14F-4D97-AF65-F5344CB8AC3E}">
+        <p14:creationId xmlns:p14="http://schemas.microsoft.com/office/powerpoint/2010/main" val="1741366660"/>
+      </p:ext>
+    </p:extLst>
+  </p:cSld>
+  <p:clrMapOvr>
+    <a:masterClrMapping/>
+  </p:clrMapOvr>
+</p:sld>
+</file>
+
+<file path=ppt/slides/slide37.xml><?xml version="1.0" encoding="utf-8"?>
+<p:sld xmlns:a="http://schemas.openxmlformats.org/drawingml/2006/main" xmlns:r="http://schemas.openxmlformats.org/officeDocument/2006/relationships" xmlns:p="http://schemas.openxmlformats.org/presentationml/2006/main">
+  <p:cSld>
+    <p:spTree>
+      <p:nvGrpSpPr>
+        <p:cNvPr id="1" name=""/>
+        <p:cNvGrpSpPr/>
+        <p:nvPr/>
+      </p:nvGrpSpPr>
+      <p:grpSpPr>
+        <a:xfrm>
+          <a:off x="0" y="0"/>
+          <a:ext cx="0" cy="0"/>
+          <a:chOff x="0" y="0"/>
+          <a:chExt cx="0" cy="0"/>
+        </a:xfrm>
+      </p:grpSpPr>
+      <p:sp>
+        <p:nvSpPr>
+          <p:cNvPr id="2" name="Title 1"/>
+          <p:cNvSpPr>
+            <a:spLocks noGrp="1"/>
+          </p:cNvSpPr>
+          <p:nvPr>
+            <p:ph type="title"/>
+          </p:nvPr>
+        </p:nvSpPr>
+        <p:spPr/>
+        <p:txBody>
+          <a:bodyPr/>
+          <a:lstStyle/>
+          <a:p>
+            <a:r>
+              <a:rPr lang="en-US" dirty="0"/>
+              <a:t>Level of Measurement</a:t>
+            </a:r>
+          </a:p>
+        </p:txBody>
+      </p:sp>
+      <p:sp>
+        <p:nvSpPr>
+          <p:cNvPr id="3" name="Content Placeholder 2"/>
+          <p:cNvSpPr>
+            <a:spLocks noGrp="1"/>
+          </p:cNvSpPr>
+          <p:nvPr>
+            <p:ph idx="1"/>
+          </p:nvPr>
+        </p:nvSpPr>
+        <p:spPr>
+          <a:xfrm>
+            <a:off x="457200" y="1371600"/>
+            <a:ext cx="8229600" cy="4525963"/>
+          </a:xfrm>
+        </p:spPr>
+        <p:txBody>
+          <a:bodyPr/>
+          <a:lstStyle/>
+          <a:p>
+            <a:r>
+              <a:rPr lang="en-US" dirty="0"/>
+              <a:t>Interval</a:t>
+            </a:r>
+            <a:r>
+              <a:rPr lang="zh-CN" altLang="en-US" dirty="0"/>
+              <a:t> </a:t>
+            </a:r>
+            <a:r>
+              <a:rPr lang="en-US" altLang="zh-CN" dirty="0"/>
+              <a:t>Scale:</a:t>
+            </a:r>
+          </a:p>
+          <a:p>
+            <a:pPr lvl="1"/>
+            <a:r>
+              <a:rPr lang="en-US" dirty="0"/>
+              <a:t>An IQ (Intelligence Quotient) score from a standardized test of intelligences is a good example of an interval scale score.</a:t>
+            </a:r>
+          </a:p>
+        </p:txBody>
+      </p:sp>
+      <p:pic>
+        <p:nvPicPr>
+          <p:cNvPr id="4" name="Picture 3" descr="Screen Shot 2018-01-25 at 10.03.01 AM.png"/>
+          <p:cNvPicPr>
+            <a:picLocks noChangeAspect="1"/>
+          </p:cNvPicPr>
+          <p:nvPr/>
+        </p:nvPicPr>
+        <p:blipFill>
+          <a:blip r:embed="rId2">
+            <a:extLst>
+              <a:ext uri="{28A0092B-C50C-407E-A947-70E740481C1C}">
+                <a14:useLocalDpi xmlns:a14="http://schemas.microsoft.com/office/drawing/2010/main" val="0"/>
+              </a:ext>
+            </a:extLst>
+          </a:blip>
+          <a:stretch>
+            <a:fillRect/>
+          </a:stretch>
+        </p:blipFill>
+        <p:spPr>
+          <a:xfrm>
+            <a:off x="1905000" y="3276600"/>
+            <a:ext cx="4375138" cy="3428999"/>
+          </a:xfrm>
+          <a:prstGeom prst="rect">
+            <a:avLst/>
+          </a:prstGeom>
+        </p:spPr>
+      </p:pic>
+    </p:spTree>
+    <p:extLst>
+      <p:ext uri="{BB962C8B-B14F-4D97-AF65-F5344CB8AC3E}">
+        <p14:creationId xmlns:p14="http://schemas.microsoft.com/office/powerpoint/2010/main" val="1529974666"/>
+      </p:ext>
+    </p:extLst>
+  </p:cSld>
+  <p:clrMapOvr>
+    <a:masterClrMapping/>
+  </p:clrMapOvr>
+</p:sld>
+</file>
+
+<file path=ppt/slides/slide38.xml><?xml version="1.0" encoding="utf-8"?>
+<p:sld xmlns:a="http://schemas.openxmlformats.org/drawingml/2006/main" xmlns:r="http://schemas.openxmlformats.org/officeDocument/2006/relationships" xmlns:p="http://schemas.openxmlformats.org/presentationml/2006/main">
+  <p:cSld>
+    <p:spTree>
+      <p:nvGrpSpPr>
+        <p:cNvPr id="1" name=""/>
+        <p:cNvGrpSpPr/>
+        <p:nvPr/>
+      </p:nvGrpSpPr>
+      <p:grpSpPr>
+        <a:xfrm>
+          <a:off x="0" y="0"/>
+          <a:ext cx="0" cy="0"/>
+          <a:chOff x="0" y="0"/>
+          <a:chExt cx="0" cy="0"/>
+        </a:xfrm>
+      </p:grpSpPr>
+      <p:sp>
+        <p:nvSpPr>
+          <p:cNvPr id="2" name="Title 1"/>
+          <p:cNvSpPr>
+            <a:spLocks noGrp="1"/>
+          </p:cNvSpPr>
+          <p:nvPr>
+            <p:ph type="title"/>
+          </p:nvPr>
+        </p:nvSpPr>
+        <p:spPr/>
+        <p:txBody>
           <a:bodyPr>
-            <a:normAutofit/>
+            <a:normAutofit fontScale="90000"/>
           </a:bodyPr>
           <a:lstStyle/>
           <a:p>
@@ -14154,8 +14637,9 @@
                 <a:latin typeface="Palatino Linotype" pitchFamily="18" charset="0"/>
                 <a:ea typeface="Cambria Math" pitchFamily="18" charset="0"/>
               </a:rPr>
-              <a:t>Summation notation </a:t>
-            </a:r>
+              <a:t>Scales (Levels) of Measurement</a:t>
+            </a:r>
+            <a:endParaRPr lang="en-US" dirty="0"/>
           </a:p>
         </p:txBody>
       </p:sp>
@@ -14171,142 +14655,85 @@
         </p:nvSpPr>
         <p:spPr/>
         <p:txBody>
-          <a:bodyPr>
-            <a:normAutofit fontScale="85000" lnSpcReduction="20000"/>
-          </a:bodyPr>
-          <a:lstStyle/>
-          <a:p>
-            <a:r>
-              <a:rPr lang="en-US" altLang="zh-Hans" dirty="0">
+          <a:bodyPr/>
+          <a:lstStyle/>
+          <a:p>
+            <a:r>
+              <a:rPr lang="en-US" dirty="0">
                 <a:latin typeface="Palatino Linotype" pitchFamily="18" charset="0"/>
-              </a:rPr>
-              <a:t>Population</a:t>
-            </a:r>
-          </a:p>
-          <a:p>
-            <a:r>
-              <a:rPr lang="en-US" altLang="zh-Hans" dirty="0">
-                <a:latin typeface="Palatino Linotype" pitchFamily="18" charset="0"/>
-              </a:rPr>
-              <a:t>Sample</a:t>
-            </a:r>
-          </a:p>
-          <a:p>
-            <a:r>
-              <a:rPr lang="en-US" altLang="zh-Hans" dirty="0">
-                <a:latin typeface="Palatino Linotype" pitchFamily="18" charset="0"/>
-              </a:rPr>
-              <a:t>Variable</a:t>
-            </a:r>
-          </a:p>
-          <a:p>
-            <a:pPr lvl="1"/>
-            <a:r>
-              <a:rPr lang="en-US" altLang="zh-Hans" dirty="0">
-                <a:latin typeface="Palatino Linotype" pitchFamily="18" charset="0"/>
-              </a:rPr>
-              <a:t>Independent</a:t>
-            </a:r>
-            <a:r>
-              <a:rPr lang="zh-Hans" altLang="en-US" dirty="0">
-                <a:latin typeface="Palatino Linotype" pitchFamily="18" charset="0"/>
-              </a:rPr>
-              <a:t> </a:t>
-            </a:r>
-            <a:r>
-              <a:rPr lang="en-US" altLang="zh-Hans" dirty="0">
-                <a:latin typeface="Palatino Linotype" pitchFamily="18" charset="0"/>
-              </a:rPr>
-              <a:t>variable</a:t>
-            </a:r>
-          </a:p>
-          <a:p>
-            <a:pPr lvl="1"/>
-            <a:r>
-              <a:rPr lang="en-US" altLang="zh-Hans" dirty="0">
-                <a:latin typeface="Palatino Linotype" pitchFamily="18" charset="0"/>
-              </a:rPr>
-              <a:t>Dependent</a:t>
-            </a:r>
-            <a:r>
-              <a:rPr lang="zh-Hans" altLang="en-US" dirty="0">
-                <a:latin typeface="Palatino Linotype" pitchFamily="18" charset="0"/>
-              </a:rPr>
-              <a:t> </a:t>
-            </a:r>
-            <a:r>
-              <a:rPr lang="en-US" altLang="zh-Hans" dirty="0">
-                <a:latin typeface="Palatino Linotype" pitchFamily="18" charset="0"/>
-              </a:rPr>
-              <a:t>variable</a:t>
-            </a:r>
-          </a:p>
-          <a:p>
-            <a:r>
-              <a:rPr lang="en-US" altLang="zh-Hans" dirty="0">
-                <a:latin typeface="Palatino Linotype" pitchFamily="18" charset="0"/>
-              </a:rPr>
-              <a:t>Data</a:t>
-            </a:r>
-          </a:p>
-          <a:p>
-            <a:pPr lvl="1"/>
-            <a:r>
-              <a:rPr lang="en-US" altLang="zh-Hans" dirty="0">
-                <a:latin typeface="Palatino Linotype" pitchFamily="18" charset="0"/>
-              </a:rPr>
-              <a:t>Nominal</a:t>
-            </a:r>
-          </a:p>
-          <a:p>
-            <a:pPr lvl="1"/>
-            <a:r>
-              <a:rPr lang="en-US" altLang="zh-Hans" dirty="0">
-                <a:latin typeface="Palatino Linotype" pitchFamily="18" charset="0"/>
-              </a:rPr>
-              <a:t>Ordinal</a:t>
-            </a:r>
-          </a:p>
-          <a:p>
-            <a:pPr lvl="1"/>
-            <a:r>
-              <a:rPr lang="en-US" altLang="zh-Hans" dirty="0">
-                <a:latin typeface="Palatino Linotype" pitchFamily="18" charset="0"/>
-              </a:rPr>
-              <a:t>Interval</a:t>
-            </a:r>
-          </a:p>
-          <a:p>
-            <a:pPr lvl="1"/>
-            <a:r>
-              <a:rPr lang="en-US" altLang="zh-Hans" dirty="0">
-                <a:latin typeface="Palatino Linotype" pitchFamily="18" charset="0"/>
+                <a:ea typeface="Cambria Math" pitchFamily="18" charset="0"/>
+                <a:cs typeface="Times New Roman" pitchFamily="18" charset="0"/>
               </a:rPr>
               <a:t>Ratio</a:t>
             </a:r>
           </a:p>
           <a:p>
+            <a:pPr lvl="1"/>
             <a:r>
               <a:rPr lang="en-US" dirty="0">
                 <a:latin typeface="Palatino Linotype" pitchFamily="18" charset="0"/>
+                <a:ea typeface="Cambria Math" pitchFamily="18" charset="0"/>
+                <a:cs typeface="Times New Roman" pitchFamily="18" charset="0"/>
               </a:rPr>
-              <a:t>Descriptive vs. Inferential</a:t>
-            </a:r>
-            <a:r>
-              <a:rPr lang="zh-Hans" altLang="en-US" dirty="0">
+              <a:t>Continuous – </a:t>
+            </a:r>
+            <a:r>
+              <a:rPr lang="en-US" i="1" dirty="0">
                 <a:latin typeface="Palatino Linotype" pitchFamily="18" charset="0"/>
+                <a:ea typeface="Cambria Math" pitchFamily="18" charset="0"/>
+                <a:cs typeface="Times New Roman" pitchFamily="18" charset="0"/>
               </a:rPr>
-              <a:t> </a:t>
-            </a:r>
-            <a:r>
-              <a:rPr lang="en-US" altLang="zh-Hans" dirty="0">
+              <a:t>Properties of an interval scale plus</a:t>
+            </a:r>
+          </a:p>
+          <a:p>
+            <a:pPr lvl="1"/>
+            <a:r>
+              <a:rPr lang="en-US" dirty="0">
                 <a:latin typeface="Palatino Linotype" pitchFamily="18" charset="0"/>
+                <a:ea typeface="Cambria Math" pitchFamily="18" charset="0"/>
+                <a:cs typeface="Times New Roman" pitchFamily="18" charset="0"/>
               </a:rPr>
-              <a:t>Statistics</a:t>
+              <a:t>Can compare ratios of scores at any location</a:t>
+            </a:r>
+          </a:p>
+          <a:p>
+            <a:pPr lvl="1"/>
+            <a:r>
+              <a:rPr lang="en-US" dirty="0">
+                <a:latin typeface="Palatino Linotype" pitchFamily="18" charset="0"/>
+                <a:ea typeface="Cambria Math" pitchFamily="18" charset="0"/>
+                <a:cs typeface="Times New Roman" pitchFamily="18" charset="0"/>
+              </a:rPr>
+              <a:t>Has a legitimate zero point</a:t>
+            </a:r>
+          </a:p>
+          <a:p>
+            <a:pPr lvl="2"/>
+            <a:r>
+              <a:rPr lang="en-US" dirty="0">
+                <a:latin typeface="Palatino Linotype" pitchFamily="18" charset="0"/>
+                <a:ea typeface="Cambria Math" pitchFamily="18" charset="0"/>
+                <a:cs typeface="Times New Roman" pitchFamily="18" charset="0"/>
+              </a:rPr>
+              <a:t>Examples: weight, height(zero is the beginning point  of the ruler, yardstick, or tape measure), days absent </a:t>
+            </a:r>
+            <a:r>
+              <a:rPr lang="en-US">
+                <a:latin typeface="Palatino Linotype" pitchFamily="18" charset="0"/>
+                <a:ea typeface="Cambria Math" pitchFamily="18" charset="0"/>
+                <a:cs typeface="Times New Roman" pitchFamily="18" charset="0"/>
+              </a:rPr>
+              <a:t>from work</a:t>
             </a:r>
             <a:endParaRPr lang="en-US" dirty="0">
               <a:latin typeface="Palatino Linotype" pitchFamily="18" charset="0"/>
+              <a:ea typeface="Cambria Math" pitchFamily="18" charset="0"/>
+              <a:cs typeface="Times New Roman" pitchFamily="18" charset="0"/>
             </a:endParaRPr>
+          </a:p>
+          <a:p>
+            <a:endParaRPr lang="en-US" dirty="0"/>
           </a:p>
         </p:txBody>
       </p:sp>
@@ -14328,7 +14755,7 @@
             <a:fld id="{DF25E0C8-8CAD-4BA8-80F3-7765EFC7DE86}" type="slidenum">
               <a:rPr lang="en-US" smtClean="0"/>
               <a:pPr/>
-              <a:t>35</a:t>
+              <a:t>38</a:t>
             </a:fld>
             <a:endParaRPr lang="en-US"/>
           </a:p>
@@ -14337,7 +14764,101 @@
     </p:spTree>
     <p:extLst>
       <p:ext uri="{BB962C8B-B14F-4D97-AF65-F5344CB8AC3E}">
-        <p14:creationId xmlns:p14="http://schemas.microsoft.com/office/powerpoint/2010/main" val="2851858392"/>
+        <p14:creationId xmlns:p14="http://schemas.microsoft.com/office/powerpoint/2010/main" val="2264746144"/>
+      </p:ext>
+    </p:extLst>
+  </p:cSld>
+  <p:clrMapOvr>
+    <a:masterClrMapping/>
+  </p:clrMapOvr>
+</p:sld>
+</file>
+
+<file path=ppt/slides/slide39.xml><?xml version="1.0" encoding="utf-8"?>
+<p:sld xmlns:a="http://schemas.openxmlformats.org/drawingml/2006/main" xmlns:r="http://schemas.openxmlformats.org/officeDocument/2006/relationships" xmlns:p="http://schemas.openxmlformats.org/presentationml/2006/main">
+  <p:cSld>
+    <p:spTree>
+      <p:nvGrpSpPr>
+        <p:cNvPr id="1" name=""/>
+        <p:cNvGrpSpPr/>
+        <p:nvPr/>
+      </p:nvGrpSpPr>
+      <p:grpSpPr>
+        <a:xfrm>
+          <a:off x="0" y="0"/>
+          <a:ext cx="0" cy="0"/>
+          <a:chOff x="0" y="0"/>
+          <a:chExt cx="0" cy="0"/>
+        </a:xfrm>
+      </p:grpSpPr>
+      <p:sp>
+        <p:nvSpPr>
+          <p:cNvPr id="2" name="Title 1">
+            <a:extLst>
+              <a:ext uri="{FF2B5EF4-FFF2-40B4-BE49-F238E27FC236}">
+                <a16:creationId xmlns:a16="http://schemas.microsoft.com/office/drawing/2014/main" id="{8E63C291-1D6D-084F-B061-AF9C0C916894}"/>
+              </a:ext>
+            </a:extLst>
+          </p:cNvPr>
+          <p:cNvSpPr>
+            <a:spLocks noGrp="1"/>
+          </p:cNvSpPr>
+          <p:nvPr>
+            <p:ph type="title"/>
+          </p:nvPr>
+        </p:nvSpPr>
+        <p:spPr/>
+        <p:txBody>
+          <a:bodyPr/>
+          <a:lstStyle/>
+          <a:p>
+            <a:r>
+              <a:rPr lang="en-US" dirty="0"/>
+              <a:t>Level of Measurement</a:t>
+            </a:r>
+          </a:p>
+        </p:txBody>
+      </p:sp>
+      <p:pic>
+        <p:nvPicPr>
+          <p:cNvPr id="5" name="Picture 4">
+            <a:extLst>
+              <a:ext uri="{FF2B5EF4-FFF2-40B4-BE49-F238E27FC236}">
+                <a16:creationId xmlns:a16="http://schemas.microsoft.com/office/drawing/2014/main" id="{ECC89766-5FA8-0247-8501-E00CB2EEA22D}"/>
+              </a:ext>
+            </a:extLst>
+          </p:cNvPr>
+          <p:cNvPicPr>
+            <a:picLocks noChangeAspect="1"/>
+          </p:cNvPicPr>
+          <p:nvPr/>
+        </p:nvPicPr>
+        <p:blipFill>
+          <a:blip r:embed="rId2">
+            <a:extLst>
+              <a:ext uri="{28A0092B-C50C-407E-A947-70E740481C1C}">
+                <a14:useLocalDpi xmlns:a14="http://schemas.microsoft.com/office/drawing/2010/main" val="0"/>
+              </a:ext>
+            </a:extLst>
+          </a:blip>
+          <a:stretch>
+            <a:fillRect/>
+          </a:stretch>
+        </p:blipFill>
+        <p:spPr>
+          <a:xfrm>
+            <a:off x="246218" y="1524000"/>
+            <a:ext cx="8651563" cy="4648200"/>
+          </a:xfrm>
+          <a:prstGeom prst="rect">
+            <a:avLst/>
+          </a:prstGeom>
+        </p:spPr>
+      </p:pic>
+    </p:spTree>
+    <p:extLst>
+      <p:ext uri="{BB962C8B-B14F-4D97-AF65-F5344CB8AC3E}">
+        <p14:creationId xmlns:p14="http://schemas.microsoft.com/office/powerpoint/2010/main" val="3321613081"/>
       </p:ext>
     </p:extLst>
   </p:cSld>
@@ -14850,6 +15371,2168 @@
       </p:par>
     </p:tnLst>
   </p:timing>
+</p:sld>
+</file>
+
+<file path=ppt/slides/slide40.xml><?xml version="1.0" encoding="utf-8"?>
+<p:sld xmlns:a="http://schemas.openxmlformats.org/drawingml/2006/main" xmlns:r="http://schemas.openxmlformats.org/officeDocument/2006/relationships" xmlns:p="http://schemas.openxmlformats.org/presentationml/2006/main">
+  <p:cSld>
+    <p:spTree>
+      <p:nvGrpSpPr>
+        <p:cNvPr id="1" name=""/>
+        <p:cNvGrpSpPr/>
+        <p:nvPr/>
+      </p:nvGrpSpPr>
+      <p:grpSpPr>
+        <a:xfrm>
+          <a:off x="0" y="0"/>
+          <a:ext cx="0" cy="0"/>
+          <a:chOff x="0" y="0"/>
+          <a:chExt cx="0" cy="0"/>
+        </a:xfrm>
+      </p:grpSpPr>
+      <p:sp>
+        <p:nvSpPr>
+          <p:cNvPr id="2" name="Title 1">
+            <a:extLst>
+              <a:ext uri="{FF2B5EF4-FFF2-40B4-BE49-F238E27FC236}">
+                <a16:creationId xmlns:a16="http://schemas.microsoft.com/office/drawing/2014/main" id="{4F69AFB7-4931-5C4F-85B9-8BD8C7AD87CA}"/>
+              </a:ext>
+            </a:extLst>
+          </p:cNvPr>
+          <p:cNvSpPr>
+            <a:spLocks noGrp="1"/>
+          </p:cNvSpPr>
+          <p:nvPr>
+            <p:ph type="title"/>
+          </p:nvPr>
+        </p:nvSpPr>
+        <p:spPr/>
+        <p:txBody>
+          <a:bodyPr/>
+          <a:lstStyle/>
+          <a:p>
+            <a:r>
+              <a:rPr lang="en-US" dirty="0"/>
+              <a:t>Summary of Knowledge</a:t>
+            </a:r>
+          </a:p>
+        </p:txBody>
+      </p:sp>
+      <p:graphicFrame>
+        <p:nvGraphicFramePr>
+          <p:cNvPr id="4" name="Table 3">
+            <a:extLst>
+              <a:ext uri="{FF2B5EF4-FFF2-40B4-BE49-F238E27FC236}">
+                <a16:creationId xmlns:a16="http://schemas.microsoft.com/office/drawing/2014/main" id="{4D9DE872-CE5B-8342-A8D0-AC7F9757E75E}"/>
+              </a:ext>
+            </a:extLst>
+          </p:cNvPr>
+          <p:cNvGraphicFramePr>
+            <a:graphicFrameLocks noGrp="1"/>
+          </p:cNvGraphicFramePr>
+          <p:nvPr>
+            <p:extLst/>
+          </p:nvPr>
+        </p:nvGraphicFramePr>
+        <p:xfrm>
+          <a:off x="228600" y="2125821"/>
+          <a:ext cx="8763000" cy="3474720"/>
+        </p:xfrm>
+        <a:graphic>
+          <a:graphicData uri="http://schemas.openxmlformats.org/drawingml/2006/table">
+            <a:tbl>
+              <a:tblPr/>
+              <a:tblGrid>
+                <a:gridCol w="1752600">
+                  <a:extLst>
+                    <a:ext uri="{9D8B030D-6E8A-4147-A177-3AD203B41FA5}">
+                      <a16:colId xmlns:a16="http://schemas.microsoft.com/office/drawing/2014/main" val="2138809966"/>
+                    </a:ext>
+                  </a:extLst>
+                </a:gridCol>
+                <a:gridCol w="1752600">
+                  <a:extLst>
+                    <a:ext uri="{9D8B030D-6E8A-4147-A177-3AD203B41FA5}">
+                      <a16:colId xmlns:a16="http://schemas.microsoft.com/office/drawing/2014/main" val="3625009282"/>
+                    </a:ext>
+                  </a:extLst>
+                </a:gridCol>
+                <a:gridCol w="1752600">
+                  <a:extLst>
+                    <a:ext uri="{9D8B030D-6E8A-4147-A177-3AD203B41FA5}">
+                      <a16:colId xmlns:a16="http://schemas.microsoft.com/office/drawing/2014/main" val="1930387339"/>
+                    </a:ext>
+                  </a:extLst>
+                </a:gridCol>
+                <a:gridCol w="1752600">
+                  <a:extLst>
+                    <a:ext uri="{9D8B030D-6E8A-4147-A177-3AD203B41FA5}">
+                      <a16:colId xmlns:a16="http://schemas.microsoft.com/office/drawing/2014/main" val="3209339463"/>
+                    </a:ext>
+                  </a:extLst>
+                </a:gridCol>
+                <a:gridCol w="1752600">
+                  <a:extLst>
+                    <a:ext uri="{9D8B030D-6E8A-4147-A177-3AD203B41FA5}">
+                      <a16:colId xmlns:a16="http://schemas.microsoft.com/office/drawing/2014/main" val="2213086135"/>
+                    </a:ext>
+                  </a:extLst>
+                </a:gridCol>
+              </a:tblGrid>
+              <a:tr h="0">
+                <a:tc>
+                  <a:txBody>
+                    <a:bodyPr/>
+                    <a:lstStyle/>
+                    <a:p>
+                      <a:pPr algn="ctr"/>
+                      <a:r>
+                        <a:rPr lang="en-US" dirty="0">
+                          <a:effectLst/>
+                        </a:rPr>
+                        <a:t>Incremental</a:t>
+                      </a:r>
+                    </a:p>
+                    <a:p>
+                      <a:pPr algn="ctr"/>
+                      <a:r>
+                        <a:rPr lang="en-US" dirty="0">
+                          <a:effectLst/>
+                        </a:rPr>
+                        <a:t>Progress</a:t>
+                      </a:r>
+                    </a:p>
+                  </a:txBody>
+                  <a:tcPr anchor="ctr">
+                    <a:lnL w="9525" cap="flat" cmpd="sng" algn="ctr">
+                      <a:solidFill>
+                        <a:srgbClr val="A2A9B1"/>
+                      </a:solidFill>
+                      <a:prstDash val="solid"/>
+                      <a:round/>
+                      <a:headEnd type="none" w="med" len="med"/>
+                      <a:tailEnd type="none" w="med" len="med"/>
+                    </a:lnL>
+                    <a:lnR w="9525" cap="flat" cmpd="sng" algn="ctr">
+                      <a:solidFill>
+                        <a:srgbClr val="A2A9B1"/>
+                      </a:solidFill>
+                      <a:prstDash val="solid"/>
+                      <a:round/>
+                      <a:headEnd type="none" w="med" len="med"/>
+                      <a:tailEnd type="none" w="med" len="med"/>
+                    </a:lnR>
+                    <a:lnT w="9525" cap="flat" cmpd="sng" algn="ctr">
+                      <a:solidFill>
+                        <a:srgbClr val="A2A9B1"/>
+                      </a:solidFill>
+                      <a:prstDash val="solid"/>
+                      <a:round/>
+                      <a:headEnd type="none" w="med" len="med"/>
+                      <a:tailEnd type="none" w="med" len="med"/>
+                    </a:lnT>
+                    <a:lnB w="9525" cap="flat" cmpd="sng" algn="ctr">
+                      <a:solidFill>
+                        <a:srgbClr val="A2A9B1"/>
+                      </a:solidFill>
+                      <a:prstDash val="solid"/>
+                      <a:round/>
+                      <a:headEnd type="none" w="med" len="med"/>
+                      <a:tailEnd type="none" w="med" len="med"/>
+                    </a:lnB>
+                    <a:solidFill>
+                      <a:srgbClr val="EAECF0"/>
+                    </a:solidFill>
+                  </a:tcPr>
+                </a:tc>
+                <a:tc>
+                  <a:txBody>
+                    <a:bodyPr/>
+                    <a:lstStyle/>
+                    <a:p>
+                      <a:pPr algn="ctr"/>
+                      <a:r>
+                        <a:rPr lang="en-US">
+                          <a:effectLst/>
+                        </a:rPr>
+                        <a:t>Measure Property</a:t>
+                      </a:r>
+                    </a:p>
+                  </a:txBody>
+                  <a:tcPr anchor="ctr">
+                    <a:lnL w="9525" cap="flat" cmpd="sng" algn="ctr">
+                      <a:solidFill>
+                        <a:srgbClr val="A2A9B1"/>
+                      </a:solidFill>
+                      <a:prstDash val="solid"/>
+                      <a:round/>
+                      <a:headEnd type="none" w="med" len="med"/>
+                      <a:tailEnd type="none" w="med" len="med"/>
+                    </a:lnL>
+                    <a:lnR w="9525" cap="flat" cmpd="sng" algn="ctr">
+                      <a:solidFill>
+                        <a:srgbClr val="A2A9B1"/>
+                      </a:solidFill>
+                      <a:prstDash val="solid"/>
+                      <a:round/>
+                      <a:headEnd type="none" w="med" len="med"/>
+                      <a:tailEnd type="none" w="med" len="med"/>
+                    </a:lnR>
+                    <a:lnT w="9525" cap="flat" cmpd="sng" algn="ctr">
+                      <a:solidFill>
+                        <a:srgbClr val="A2A9B1"/>
+                      </a:solidFill>
+                      <a:prstDash val="solid"/>
+                      <a:round/>
+                      <a:headEnd type="none" w="med" len="med"/>
+                      <a:tailEnd type="none" w="med" len="med"/>
+                    </a:lnT>
+                    <a:lnB w="9525" cap="flat" cmpd="sng" algn="ctr">
+                      <a:solidFill>
+                        <a:srgbClr val="A2A9B1"/>
+                      </a:solidFill>
+                      <a:prstDash val="solid"/>
+                      <a:round/>
+                      <a:headEnd type="none" w="med" len="med"/>
+                      <a:tailEnd type="none" w="med" len="med"/>
+                    </a:lnB>
+                    <a:solidFill>
+                      <a:srgbClr val="EAECF0"/>
+                    </a:solidFill>
+                  </a:tcPr>
+                </a:tc>
+                <a:tc>
+                  <a:txBody>
+                    <a:bodyPr/>
+                    <a:lstStyle/>
+                    <a:p>
+                      <a:pPr algn="ctr"/>
+                      <a:r>
+                        <a:rPr lang="en-US" dirty="0">
+                          <a:effectLst/>
+                        </a:rPr>
+                        <a:t>Mathematical</a:t>
+                      </a:r>
+                    </a:p>
+                    <a:p>
+                      <a:pPr algn="ctr"/>
+                      <a:r>
+                        <a:rPr lang="en-US" dirty="0">
+                          <a:effectLst/>
+                        </a:rPr>
+                        <a:t>Operators</a:t>
+                      </a:r>
+                    </a:p>
+                  </a:txBody>
+                  <a:tcPr anchor="ctr">
+                    <a:lnL w="9525" cap="flat" cmpd="sng" algn="ctr">
+                      <a:solidFill>
+                        <a:srgbClr val="A2A9B1"/>
+                      </a:solidFill>
+                      <a:prstDash val="solid"/>
+                      <a:round/>
+                      <a:headEnd type="none" w="med" len="med"/>
+                      <a:tailEnd type="none" w="med" len="med"/>
+                    </a:lnL>
+                    <a:lnR w="9525" cap="flat" cmpd="sng" algn="ctr">
+                      <a:solidFill>
+                        <a:srgbClr val="A2A9B1"/>
+                      </a:solidFill>
+                      <a:prstDash val="solid"/>
+                      <a:round/>
+                      <a:headEnd type="none" w="med" len="med"/>
+                      <a:tailEnd type="none" w="med" len="med"/>
+                    </a:lnR>
+                    <a:lnT w="9525" cap="flat" cmpd="sng" algn="ctr">
+                      <a:solidFill>
+                        <a:srgbClr val="A2A9B1"/>
+                      </a:solidFill>
+                      <a:prstDash val="solid"/>
+                      <a:round/>
+                      <a:headEnd type="none" w="med" len="med"/>
+                      <a:tailEnd type="none" w="med" len="med"/>
+                    </a:lnT>
+                    <a:lnB w="9525" cap="flat" cmpd="sng" algn="ctr">
+                      <a:solidFill>
+                        <a:srgbClr val="A2A9B1"/>
+                      </a:solidFill>
+                      <a:prstDash val="solid"/>
+                      <a:round/>
+                      <a:headEnd type="none" w="med" len="med"/>
+                      <a:tailEnd type="none" w="med" len="med"/>
+                    </a:lnB>
+                    <a:solidFill>
+                      <a:srgbClr val="EAECF0"/>
+                    </a:solidFill>
+                  </a:tcPr>
+                </a:tc>
+                <a:tc>
+                  <a:txBody>
+                    <a:bodyPr/>
+                    <a:lstStyle/>
+                    <a:p>
+                      <a:pPr algn="ctr"/>
+                      <a:r>
+                        <a:rPr lang="en-US" dirty="0">
+                          <a:effectLst/>
+                        </a:rPr>
+                        <a:t>Advanced</a:t>
+                      </a:r>
+                    </a:p>
+                    <a:p>
+                      <a:pPr algn="ctr"/>
+                      <a:r>
+                        <a:rPr lang="en-US" dirty="0">
+                          <a:effectLst/>
+                        </a:rPr>
+                        <a:t>Operations</a:t>
+                      </a:r>
+                    </a:p>
+                  </a:txBody>
+                  <a:tcPr anchor="ctr">
+                    <a:lnL w="9525" cap="flat" cmpd="sng" algn="ctr">
+                      <a:solidFill>
+                        <a:srgbClr val="A2A9B1"/>
+                      </a:solidFill>
+                      <a:prstDash val="solid"/>
+                      <a:round/>
+                      <a:headEnd type="none" w="med" len="med"/>
+                      <a:tailEnd type="none" w="med" len="med"/>
+                    </a:lnL>
+                    <a:lnR w="9525" cap="flat" cmpd="sng" algn="ctr">
+                      <a:solidFill>
+                        <a:srgbClr val="A2A9B1"/>
+                      </a:solidFill>
+                      <a:prstDash val="solid"/>
+                      <a:round/>
+                      <a:headEnd type="none" w="med" len="med"/>
+                      <a:tailEnd type="none" w="med" len="med"/>
+                    </a:lnR>
+                    <a:lnT w="9525" cap="flat" cmpd="sng" algn="ctr">
+                      <a:solidFill>
+                        <a:srgbClr val="A2A9B1"/>
+                      </a:solidFill>
+                      <a:prstDash val="solid"/>
+                      <a:round/>
+                      <a:headEnd type="none" w="med" len="med"/>
+                      <a:tailEnd type="none" w="med" len="med"/>
+                    </a:lnT>
+                    <a:lnB w="9525" cap="flat" cmpd="sng" algn="ctr">
+                      <a:solidFill>
+                        <a:srgbClr val="A2A9B1"/>
+                      </a:solidFill>
+                      <a:prstDash val="solid"/>
+                      <a:round/>
+                      <a:headEnd type="none" w="med" len="med"/>
+                      <a:tailEnd type="none" w="med" len="med"/>
+                    </a:lnB>
+                    <a:solidFill>
+                      <a:srgbClr val="EAECF0"/>
+                    </a:solidFill>
+                  </a:tcPr>
+                </a:tc>
+                <a:tc>
+                  <a:txBody>
+                    <a:bodyPr/>
+                    <a:lstStyle/>
+                    <a:p>
+                      <a:pPr algn="ctr"/>
+                      <a:r>
+                        <a:rPr lang="en-US" dirty="0">
+                          <a:effectLst/>
+                        </a:rPr>
+                        <a:t>Central</a:t>
+                      </a:r>
+                    </a:p>
+                    <a:p>
+                      <a:pPr algn="ctr"/>
+                      <a:r>
+                        <a:rPr lang="en-US" dirty="0">
+                          <a:effectLst/>
+                        </a:rPr>
+                        <a:t>Tendency</a:t>
+                      </a:r>
+                    </a:p>
+                  </a:txBody>
+                  <a:tcPr anchor="ctr">
+                    <a:lnL w="9525" cap="flat" cmpd="sng" algn="ctr">
+                      <a:solidFill>
+                        <a:srgbClr val="A2A9B1"/>
+                      </a:solidFill>
+                      <a:prstDash val="solid"/>
+                      <a:round/>
+                      <a:headEnd type="none" w="med" len="med"/>
+                      <a:tailEnd type="none" w="med" len="med"/>
+                    </a:lnL>
+                    <a:lnR w="9525" cap="flat" cmpd="sng" algn="ctr">
+                      <a:solidFill>
+                        <a:srgbClr val="A2A9B1"/>
+                      </a:solidFill>
+                      <a:prstDash val="solid"/>
+                      <a:round/>
+                      <a:headEnd type="none" w="med" len="med"/>
+                      <a:tailEnd type="none" w="med" len="med"/>
+                    </a:lnR>
+                    <a:lnT w="9525" cap="flat" cmpd="sng" algn="ctr">
+                      <a:solidFill>
+                        <a:srgbClr val="A2A9B1"/>
+                      </a:solidFill>
+                      <a:prstDash val="solid"/>
+                      <a:round/>
+                      <a:headEnd type="none" w="med" len="med"/>
+                      <a:tailEnd type="none" w="med" len="med"/>
+                    </a:lnT>
+                    <a:lnB w="9525" cap="flat" cmpd="sng" algn="ctr">
+                      <a:solidFill>
+                        <a:srgbClr val="A2A9B1"/>
+                      </a:solidFill>
+                      <a:prstDash val="solid"/>
+                      <a:round/>
+                      <a:headEnd type="none" w="med" len="med"/>
+                      <a:tailEnd type="none" w="med" len="med"/>
+                    </a:lnB>
+                    <a:solidFill>
+                      <a:srgbClr val="EAECF0"/>
+                    </a:solidFill>
+                  </a:tcPr>
+                </a:tc>
+                <a:extLst>
+                  <a:ext uri="{0D108BD9-81ED-4DB2-BD59-A6C34878D82A}">
+                    <a16:rowId xmlns:a16="http://schemas.microsoft.com/office/drawing/2014/main" val="1494116103"/>
+                  </a:ext>
+                </a:extLst>
+              </a:tr>
+              <a:tr h="0">
+                <a:tc>
+                  <a:txBody>
+                    <a:bodyPr/>
+                    <a:lstStyle/>
+                    <a:p>
+                      <a:r>
+                        <a:rPr lang="en-US">
+                          <a:effectLst/>
+                        </a:rPr>
+                        <a:t>Nominal</a:t>
+                      </a:r>
+                    </a:p>
+                  </a:txBody>
+                  <a:tcPr anchor="ctr">
+                    <a:lnL w="9525" cap="flat" cmpd="sng" algn="ctr">
+                      <a:solidFill>
+                        <a:srgbClr val="A2A9B1"/>
+                      </a:solidFill>
+                      <a:prstDash val="solid"/>
+                      <a:round/>
+                      <a:headEnd type="none" w="med" len="med"/>
+                      <a:tailEnd type="none" w="med" len="med"/>
+                    </a:lnL>
+                    <a:lnR w="9525" cap="flat" cmpd="sng" algn="ctr">
+                      <a:solidFill>
+                        <a:srgbClr val="A2A9B1"/>
+                      </a:solidFill>
+                      <a:prstDash val="solid"/>
+                      <a:round/>
+                      <a:headEnd type="none" w="med" len="med"/>
+                      <a:tailEnd type="none" w="med" len="med"/>
+                    </a:lnR>
+                    <a:lnT w="9525" cap="flat" cmpd="sng" algn="ctr">
+                      <a:solidFill>
+                        <a:srgbClr val="A2A9B1"/>
+                      </a:solidFill>
+                      <a:prstDash val="solid"/>
+                      <a:round/>
+                      <a:headEnd type="none" w="med" len="med"/>
+                      <a:tailEnd type="none" w="med" len="med"/>
+                    </a:lnT>
+                    <a:lnB w="9525" cap="flat" cmpd="sng" algn="ctr">
+                      <a:solidFill>
+                        <a:srgbClr val="A2A9B1"/>
+                      </a:solidFill>
+                      <a:prstDash val="solid"/>
+                      <a:round/>
+                      <a:headEnd type="none" w="med" len="med"/>
+                      <a:tailEnd type="none" w="med" len="med"/>
+                    </a:lnB>
+                    <a:solidFill>
+                      <a:srgbClr val="F8F9FA"/>
+                    </a:solidFill>
+                  </a:tcPr>
+                </a:tc>
+                <a:tc>
+                  <a:txBody>
+                    <a:bodyPr/>
+                    <a:lstStyle/>
+                    <a:p>
+                      <a:r>
+                        <a:rPr lang="en-US">
+                          <a:effectLst/>
+                        </a:rPr>
+                        <a:t>Classification, Membership</a:t>
+                      </a:r>
+                    </a:p>
+                  </a:txBody>
+                  <a:tcPr anchor="ctr">
+                    <a:lnL w="9525" cap="flat" cmpd="sng" algn="ctr">
+                      <a:solidFill>
+                        <a:srgbClr val="A2A9B1"/>
+                      </a:solidFill>
+                      <a:prstDash val="solid"/>
+                      <a:round/>
+                      <a:headEnd type="none" w="med" len="med"/>
+                      <a:tailEnd type="none" w="med" len="med"/>
+                    </a:lnL>
+                    <a:lnR w="9525" cap="flat" cmpd="sng" algn="ctr">
+                      <a:solidFill>
+                        <a:srgbClr val="A2A9B1"/>
+                      </a:solidFill>
+                      <a:prstDash val="solid"/>
+                      <a:round/>
+                      <a:headEnd type="none" w="med" len="med"/>
+                      <a:tailEnd type="none" w="med" len="med"/>
+                    </a:lnR>
+                    <a:lnT w="9525" cap="flat" cmpd="sng" algn="ctr">
+                      <a:solidFill>
+                        <a:srgbClr val="A2A9B1"/>
+                      </a:solidFill>
+                      <a:prstDash val="solid"/>
+                      <a:round/>
+                      <a:headEnd type="none" w="med" len="med"/>
+                      <a:tailEnd type="none" w="med" len="med"/>
+                    </a:lnT>
+                    <a:lnB w="9525" cap="flat" cmpd="sng" algn="ctr">
+                      <a:solidFill>
+                        <a:srgbClr val="A2A9B1"/>
+                      </a:solidFill>
+                      <a:prstDash val="solid"/>
+                      <a:round/>
+                      <a:headEnd type="none" w="med" len="med"/>
+                      <a:tailEnd type="none" w="med" len="med"/>
+                    </a:lnB>
+                    <a:solidFill>
+                      <a:srgbClr val="F8F9FA"/>
+                    </a:solidFill>
+                  </a:tcPr>
+                </a:tc>
+                <a:tc>
+                  <a:txBody>
+                    <a:bodyPr/>
+                    <a:lstStyle/>
+                    <a:p>
+                      <a:r>
+                        <a:rPr lang="en-US">
+                          <a:effectLst/>
+                        </a:rPr>
+                        <a:t>=, !=</a:t>
+                      </a:r>
+                    </a:p>
+                  </a:txBody>
+                  <a:tcPr anchor="ctr">
+                    <a:lnL w="9525" cap="flat" cmpd="sng" algn="ctr">
+                      <a:solidFill>
+                        <a:srgbClr val="A2A9B1"/>
+                      </a:solidFill>
+                      <a:prstDash val="solid"/>
+                      <a:round/>
+                      <a:headEnd type="none" w="med" len="med"/>
+                      <a:tailEnd type="none" w="med" len="med"/>
+                    </a:lnL>
+                    <a:lnR w="9525" cap="flat" cmpd="sng" algn="ctr">
+                      <a:solidFill>
+                        <a:srgbClr val="A2A9B1"/>
+                      </a:solidFill>
+                      <a:prstDash val="solid"/>
+                      <a:round/>
+                      <a:headEnd type="none" w="med" len="med"/>
+                      <a:tailEnd type="none" w="med" len="med"/>
+                    </a:lnR>
+                    <a:lnT w="9525" cap="flat" cmpd="sng" algn="ctr">
+                      <a:solidFill>
+                        <a:srgbClr val="A2A9B1"/>
+                      </a:solidFill>
+                      <a:prstDash val="solid"/>
+                      <a:round/>
+                      <a:headEnd type="none" w="med" len="med"/>
+                      <a:tailEnd type="none" w="med" len="med"/>
+                    </a:lnT>
+                    <a:lnB w="9525" cap="flat" cmpd="sng" algn="ctr">
+                      <a:solidFill>
+                        <a:srgbClr val="A2A9B1"/>
+                      </a:solidFill>
+                      <a:prstDash val="solid"/>
+                      <a:round/>
+                      <a:headEnd type="none" w="med" len="med"/>
+                      <a:tailEnd type="none" w="med" len="med"/>
+                    </a:lnB>
+                    <a:solidFill>
+                      <a:srgbClr val="F8F9FA"/>
+                    </a:solidFill>
+                  </a:tcPr>
+                </a:tc>
+                <a:tc>
+                  <a:txBody>
+                    <a:bodyPr/>
+                    <a:lstStyle/>
+                    <a:p>
+                      <a:r>
+                        <a:rPr lang="en-US">
+                          <a:effectLst/>
+                        </a:rPr>
+                        <a:t>Grouping</a:t>
+                      </a:r>
+                    </a:p>
+                  </a:txBody>
+                  <a:tcPr anchor="ctr">
+                    <a:lnL w="9525" cap="flat" cmpd="sng" algn="ctr">
+                      <a:solidFill>
+                        <a:srgbClr val="A2A9B1"/>
+                      </a:solidFill>
+                      <a:prstDash val="solid"/>
+                      <a:round/>
+                      <a:headEnd type="none" w="med" len="med"/>
+                      <a:tailEnd type="none" w="med" len="med"/>
+                    </a:lnL>
+                    <a:lnR w="9525" cap="flat" cmpd="sng" algn="ctr">
+                      <a:solidFill>
+                        <a:srgbClr val="A2A9B1"/>
+                      </a:solidFill>
+                      <a:prstDash val="solid"/>
+                      <a:round/>
+                      <a:headEnd type="none" w="med" len="med"/>
+                      <a:tailEnd type="none" w="med" len="med"/>
+                    </a:lnR>
+                    <a:lnT w="9525" cap="flat" cmpd="sng" algn="ctr">
+                      <a:solidFill>
+                        <a:srgbClr val="A2A9B1"/>
+                      </a:solidFill>
+                      <a:prstDash val="solid"/>
+                      <a:round/>
+                      <a:headEnd type="none" w="med" len="med"/>
+                      <a:tailEnd type="none" w="med" len="med"/>
+                    </a:lnT>
+                    <a:lnB w="9525" cap="flat" cmpd="sng" algn="ctr">
+                      <a:solidFill>
+                        <a:srgbClr val="A2A9B1"/>
+                      </a:solidFill>
+                      <a:prstDash val="solid"/>
+                      <a:round/>
+                      <a:headEnd type="none" w="med" len="med"/>
+                      <a:tailEnd type="none" w="med" len="med"/>
+                    </a:lnB>
+                    <a:solidFill>
+                      <a:srgbClr val="F8F9FA"/>
+                    </a:solidFill>
+                  </a:tcPr>
+                </a:tc>
+                <a:tc>
+                  <a:txBody>
+                    <a:bodyPr/>
+                    <a:lstStyle/>
+                    <a:p>
+                      <a:r>
+                        <a:rPr lang="en-US">
+                          <a:effectLst/>
+                        </a:rPr>
+                        <a:t>Mode</a:t>
+                      </a:r>
+                    </a:p>
+                  </a:txBody>
+                  <a:tcPr anchor="ctr">
+                    <a:lnL w="9525" cap="flat" cmpd="sng" algn="ctr">
+                      <a:solidFill>
+                        <a:srgbClr val="A2A9B1"/>
+                      </a:solidFill>
+                      <a:prstDash val="solid"/>
+                      <a:round/>
+                      <a:headEnd type="none" w="med" len="med"/>
+                      <a:tailEnd type="none" w="med" len="med"/>
+                    </a:lnL>
+                    <a:lnR w="9525" cap="flat" cmpd="sng" algn="ctr">
+                      <a:solidFill>
+                        <a:srgbClr val="A2A9B1"/>
+                      </a:solidFill>
+                      <a:prstDash val="solid"/>
+                      <a:round/>
+                      <a:headEnd type="none" w="med" len="med"/>
+                      <a:tailEnd type="none" w="med" len="med"/>
+                    </a:lnR>
+                    <a:lnT w="9525" cap="flat" cmpd="sng" algn="ctr">
+                      <a:solidFill>
+                        <a:srgbClr val="A2A9B1"/>
+                      </a:solidFill>
+                      <a:prstDash val="solid"/>
+                      <a:round/>
+                      <a:headEnd type="none" w="med" len="med"/>
+                      <a:tailEnd type="none" w="med" len="med"/>
+                    </a:lnT>
+                    <a:lnB w="9525" cap="flat" cmpd="sng" algn="ctr">
+                      <a:solidFill>
+                        <a:srgbClr val="A2A9B1"/>
+                      </a:solidFill>
+                      <a:prstDash val="solid"/>
+                      <a:round/>
+                      <a:headEnd type="none" w="med" len="med"/>
+                      <a:tailEnd type="none" w="med" len="med"/>
+                    </a:lnB>
+                    <a:solidFill>
+                      <a:srgbClr val="F8F9FA"/>
+                    </a:solidFill>
+                  </a:tcPr>
+                </a:tc>
+                <a:extLst>
+                  <a:ext uri="{0D108BD9-81ED-4DB2-BD59-A6C34878D82A}">
+                    <a16:rowId xmlns:a16="http://schemas.microsoft.com/office/drawing/2014/main" val="696739208"/>
+                  </a:ext>
+                </a:extLst>
+              </a:tr>
+              <a:tr h="0">
+                <a:tc>
+                  <a:txBody>
+                    <a:bodyPr/>
+                    <a:lstStyle/>
+                    <a:p>
+                      <a:r>
+                        <a:rPr lang="en-US">
+                          <a:effectLst/>
+                        </a:rPr>
+                        <a:t>Ordinal</a:t>
+                      </a:r>
+                    </a:p>
+                  </a:txBody>
+                  <a:tcPr anchor="ctr">
+                    <a:lnL w="9525" cap="flat" cmpd="sng" algn="ctr">
+                      <a:solidFill>
+                        <a:srgbClr val="A2A9B1"/>
+                      </a:solidFill>
+                      <a:prstDash val="solid"/>
+                      <a:round/>
+                      <a:headEnd type="none" w="med" len="med"/>
+                      <a:tailEnd type="none" w="med" len="med"/>
+                    </a:lnL>
+                    <a:lnR w="9525" cap="flat" cmpd="sng" algn="ctr">
+                      <a:solidFill>
+                        <a:srgbClr val="A2A9B1"/>
+                      </a:solidFill>
+                      <a:prstDash val="solid"/>
+                      <a:round/>
+                      <a:headEnd type="none" w="med" len="med"/>
+                      <a:tailEnd type="none" w="med" len="med"/>
+                    </a:lnR>
+                    <a:lnT w="9525" cap="flat" cmpd="sng" algn="ctr">
+                      <a:solidFill>
+                        <a:srgbClr val="A2A9B1"/>
+                      </a:solidFill>
+                      <a:prstDash val="solid"/>
+                      <a:round/>
+                      <a:headEnd type="none" w="med" len="med"/>
+                      <a:tailEnd type="none" w="med" len="med"/>
+                    </a:lnT>
+                    <a:lnB w="9525" cap="flat" cmpd="sng" algn="ctr">
+                      <a:solidFill>
+                        <a:srgbClr val="A2A9B1"/>
+                      </a:solidFill>
+                      <a:prstDash val="solid"/>
+                      <a:round/>
+                      <a:headEnd type="none" w="med" len="med"/>
+                      <a:tailEnd type="none" w="med" len="med"/>
+                    </a:lnB>
+                    <a:solidFill>
+                      <a:srgbClr val="F8F9FA"/>
+                    </a:solidFill>
+                  </a:tcPr>
+                </a:tc>
+                <a:tc>
+                  <a:txBody>
+                    <a:bodyPr/>
+                    <a:lstStyle/>
+                    <a:p>
+                      <a:r>
+                        <a:rPr lang="en-US">
+                          <a:effectLst/>
+                        </a:rPr>
+                        <a:t>Comparison, Level</a:t>
+                      </a:r>
+                    </a:p>
+                  </a:txBody>
+                  <a:tcPr anchor="ctr">
+                    <a:lnL w="9525" cap="flat" cmpd="sng" algn="ctr">
+                      <a:solidFill>
+                        <a:srgbClr val="A2A9B1"/>
+                      </a:solidFill>
+                      <a:prstDash val="solid"/>
+                      <a:round/>
+                      <a:headEnd type="none" w="med" len="med"/>
+                      <a:tailEnd type="none" w="med" len="med"/>
+                    </a:lnL>
+                    <a:lnR w="9525" cap="flat" cmpd="sng" algn="ctr">
+                      <a:solidFill>
+                        <a:srgbClr val="A2A9B1"/>
+                      </a:solidFill>
+                      <a:prstDash val="solid"/>
+                      <a:round/>
+                      <a:headEnd type="none" w="med" len="med"/>
+                      <a:tailEnd type="none" w="med" len="med"/>
+                    </a:lnR>
+                    <a:lnT w="9525" cap="flat" cmpd="sng" algn="ctr">
+                      <a:solidFill>
+                        <a:srgbClr val="A2A9B1"/>
+                      </a:solidFill>
+                      <a:prstDash val="solid"/>
+                      <a:round/>
+                      <a:headEnd type="none" w="med" len="med"/>
+                      <a:tailEnd type="none" w="med" len="med"/>
+                    </a:lnT>
+                    <a:lnB w="9525" cap="flat" cmpd="sng" algn="ctr">
+                      <a:solidFill>
+                        <a:srgbClr val="A2A9B1"/>
+                      </a:solidFill>
+                      <a:prstDash val="solid"/>
+                      <a:round/>
+                      <a:headEnd type="none" w="med" len="med"/>
+                      <a:tailEnd type="none" w="med" len="med"/>
+                    </a:lnB>
+                    <a:solidFill>
+                      <a:srgbClr val="F8F9FA"/>
+                    </a:solidFill>
+                  </a:tcPr>
+                </a:tc>
+                <a:tc>
+                  <a:txBody>
+                    <a:bodyPr/>
+                    <a:lstStyle/>
+                    <a:p>
+                      <a:r>
+                        <a:rPr lang="en-US">
+                          <a:effectLst/>
+                        </a:rPr>
+                        <a:t>&gt;, &lt;</a:t>
+                      </a:r>
+                    </a:p>
+                  </a:txBody>
+                  <a:tcPr anchor="ctr">
+                    <a:lnL w="9525" cap="flat" cmpd="sng" algn="ctr">
+                      <a:solidFill>
+                        <a:srgbClr val="A2A9B1"/>
+                      </a:solidFill>
+                      <a:prstDash val="solid"/>
+                      <a:round/>
+                      <a:headEnd type="none" w="med" len="med"/>
+                      <a:tailEnd type="none" w="med" len="med"/>
+                    </a:lnL>
+                    <a:lnR w="9525" cap="flat" cmpd="sng" algn="ctr">
+                      <a:solidFill>
+                        <a:srgbClr val="A2A9B1"/>
+                      </a:solidFill>
+                      <a:prstDash val="solid"/>
+                      <a:round/>
+                      <a:headEnd type="none" w="med" len="med"/>
+                      <a:tailEnd type="none" w="med" len="med"/>
+                    </a:lnR>
+                    <a:lnT w="9525" cap="flat" cmpd="sng" algn="ctr">
+                      <a:solidFill>
+                        <a:srgbClr val="A2A9B1"/>
+                      </a:solidFill>
+                      <a:prstDash val="solid"/>
+                      <a:round/>
+                      <a:headEnd type="none" w="med" len="med"/>
+                      <a:tailEnd type="none" w="med" len="med"/>
+                    </a:lnT>
+                    <a:lnB w="9525" cap="flat" cmpd="sng" algn="ctr">
+                      <a:solidFill>
+                        <a:srgbClr val="A2A9B1"/>
+                      </a:solidFill>
+                      <a:prstDash val="solid"/>
+                      <a:round/>
+                      <a:headEnd type="none" w="med" len="med"/>
+                      <a:tailEnd type="none" w="med" len="med"/>
+                    </a:lnB>
+                    <a:solidFill>
+                      <a:srgbClr val="F8F9FA"/>
+                    </a:solidFill>
+                  </a:tcPr>
+                </a:tc>
+                <a:tc>
+                  <a:txBody>
+                    <a:bodyPr/>
+                    <a:lstStyle/>
+                    <a:p>
+                      <a:r>
+                        <a:rPr lang="en-US">
+                          <a:effectLst/>
+                        </a:rPr>
+                        <a:t>Sorting</a:t>
+                      </a:r>
+                    </a:p>
+                  </a:txBody>
+                  <a:tcPr anchor="ctr">
+                    <a:lnL w="9525" cap="flat" cmpd="sng" algn="ctr">
+                      <a:solidFill>
+                        <a:srgbClr val="A2A9B1"/>
+                      </a:solidFill>
+                      <a:prstDash val="solid"/>
+                      <a:round/>
+                      <a:headEnd type="none" w="med" len="med"/>
+                      <a:tailEnd type="none" w="med" len="med"/>
+                    </a:lnL>
+                    <a:lnR w="9525" cap="flat" cmpd="sng" algn="ctr">
+                      <a:solidFill>
+                        <a:srgbClr val="A2A9B1"/>
+                      </a:solidFill>
+                      <a:prstDash val="solid"/>
+                      <a:round/>
+                      <a:headEnd type="none" w="med" len="med"/>
+                      <a:tailEnd type="none" w="med" len="med"/>
+                    </a:lnR>
+                    <a:lnT w="9525" cap="flat" cmpd="sng" algn="ctr">
+                      <a:solidFill>
+                        <a:srgbClr val="A2A9B1"/>
+                      </a:solidFill>
+                      <a:prstDash val="solid"/>
+                      <a:round/>
+                      <a:headEnd type="none" w="med" len="med"/>
+                      <a:tailEnd type="none" w="med" len="med"/>
+                    </a:lnT>
+                    <a:lnB w="9525" cap="flat" cmpd="sng" algn="ctr">
+                      <a:solidFill>
+                        <a:srgbClr val="A2A9B1"/>
+                      </a:solidFill>
+                      <a:prstDash val="solid"/>
+                      <a:round/>
+                      <a:headEnd type="none" w="med" len="med"/>
+                      <a:tailEnd type="none" w="med" len="med"/>
+                    </a:lnB>
+                    <a:solidFill>
+                      <a:srgbClr val="F8F9FA"/>
+                    </a:solidFill>
+                  </a:tcPr>
+                </a:tc>
+                <a:tc>
+                  <a:txBody>
+                    <a:bodyPr/>
+                    <a:lstStyle/>
+                    <a:p>
+                      <a:r>
+                        <a:rPr lang="en-US">
+                          <a:effectLst/>
+                        </a:rPr>
+                        <a:t>Median</a:t>
+                      </a:r>
+                    </a:p>
+                  </a:txBody>
+                  <a:tcPr anchor="ctr">
+                    <a:lnL w="9525" cap="flat" cmpd="sng" algn="ctr">
+                      <a:solidFill>
+                        <a:srgbClr val="A2A9B1"/>
+                      </a:solidFill>
+                      <a:prstDash val="solid"/>
+                      <a:round/>
+                      <a:headEnd type="none" w="med" len="med"/>
+                      <a:tailEnd type="none" w="med" len="med"/>
+                    </a:lnL>
+                    <a:lnR w="9525" cap="flat" cmpd="sng" algn="ctr">
+                      <a:solidFill>
+                        <a:srgbClr val="A2A9B1"/>
+                      </a:solidFill>
+                      <a:prstDash val="solid"/>
+                      <a:round/>
+                      <a:headEnd type="none" w="med" len="med"/>
+                      <a:tailEnd type="none" w="med" len="med"/>
+                    </a:lnR>
+                    <a:lnT w="9525" cap="flat" cmpd="sng" algn="ctr">
+                      <a:solidFill>
+                        <a:srgbClr val="A2A9B1"/>
+                      </a:solidFill>
+                      <a:prstDash val="solid"/>
+                      <a:round/>
+                      <a:headEnd type="none" w="med" len="med"/>
+                      <a:tailEnd type="none" w="med" len="med"/>
+                    </a:lnT>
+                    <a:lnB w="9525" cap="flat" cmpd="sng" algn="ctr">
+                      <a:solidFill>
+                        <a:srgbClr val="A2A9B1"/>
+                      </a:solidFill>
+                      <a:prstDash val="solid"/>
+                      <a:round/>
+                      <a:headEnd type="none" w="med" len="med"/>
+                      <a:tailEnd type="none" w="med" len="med"/>
+                    </a:lnB>
+                    <a:solidFill>
+                      <a:srgbClr val="F8F9FA"/>
+                    </a:solidFill>
+                  </a:tcPr>
+                </a:tc>
+                <a:extLst>
+                  <a:ext uri="{0D108BD9-81ED-4DB2-BD59-A6C34878D82A}">
+                    <a16:rowId xmlns:a16="http://schemas.microsoft.com/office/drawing/2014/main" val="3113593515"/>
+                  </a:ext>
+                </a:extLst>
+              </a:tr>
+              <a:tr h="0">
+                <a:tc>
+                  <a:txBody>
+                    <a:bodyPr/>
+                    <a:lstStyle/>
+                    <a:p>
+                      <a:r>
+                        <a:rPr lang="en-US">
+                          <a:effectLst/>
+                        </a:rPr>
+                        <a:t>Interval</a:t>
+                      </a:r>
+                    </a:p>
+                  </a:txBody>
+                  <a:tcPr anchor="ctr">
+                    <a:lnL w="9525" cap="flat" cmpd="sng" algn="ctr">
+                      <a:solidFill>
+                        <a:srgbClr val="A2A9B1"/>
+                      </a:solidFill>
+                      <a:prstDash val="solid"/>
+                      <a:round/>
+                      <a:headEnd type="none" w="med" len="med"/>
+                      <a:tailEnd type="none" w="med" len="med"/>
+                    </a:lnL>
+                    <a:lnR w="9525" cap="flat" cmpd="sng" algn="ctr">
+                      <a:solidFill>
+                        <a:srgbClr val="A2A9B1"/>
+                      </a:solidFill>
+                      <a:prstDash val="solid"/>
+                      <a:round/>
+                      <a:headEnd type="none" w="med" len="med"/>
+                      <a:tailEnd type="none" w="med" len="med"/>
+                    </a:lnR>
+                    <a:lnT w="9525" cap="flat" cmpd="sng" algn="ctr">
+                      <a:solidFill>
+                        <a:srgbClr val="A2A9B1"/>
+                      </a:solidFill>
+                      <a:prstDash val="solid"/>
+                      <a:round/>
+                      <a:headEnd type="none" w="med" len="med"/>
+                      <a:tailEnd type="none" w="med" len="med"/>
+                    </a:lnT>
+                    <a:lnB w="9525" cap="flat" cmpd="sng" algn="ctr">
+                      <a:solidFill>
+                        <a:srgbClr val="A2A9B1"/>
+                      </a:solidFill>
+                      <a:prstDash val="solid"/>
+                      <a:round/>
+                      <a:headEnd type="none" w="med" len="med"/>
+                      <a:tailEnd type="none" w="med" len="med"/>
+                    </a:lnB>
+                    <a:solidFill>
+                      <a:srgbClr val="F8F9FA"/>
+                    </a:solidFill>
+                  </a:tcPr>
+                </a:tc>
+                <a:tc>
+                  <a:txBody>
+                    <a:bodyPr/>
+                    <a:lstStyle/>
+                    <a:p>
+                      <a:r>
+                        <a:rPr lang="en-US">
+                          <a:effectLst/>
+                        </a:rPr>
+                        <a:t>Difference, Affinity</a:t>
+                      </a:r>
+                    </a:p>
+                  </a:txBody>
+                  <a:tcPr anchor="ctr">
+                    <a:lnL w="9525" cap="flat" cmpd="sng" algn="ctr">
+                      <a:solidFill>
+                        <a:srgbClr val="A2A9B1"/>
+                      </a:solidFill>
+                      <a:prstDash val="solid"/>
+                      <a:round/>
+                      <a:headEnd type="none" w="med" len="med"/>
+                      <a:tailEnd type="none" w="med" len="med"/>
+                    </a:lnL>
+                    <a:lnR w="9525" cap="flat" cmpd="sng" algn="ctr">
+                      <a:solidFill>
+                        <a:srgbClr val="A2A9B1"/>
+                      </a:solidFill>
+                      <a:prstDash val="solid"/>
+                      <a:round/>
+                      <a:headEnd type="none" w="med" len="med"/>
+                      <a:tailEnd type="none" w="med" len="med"/>
+                    </a:lnR>
+                    <a:lnT w="9525" cap="flat" cmpd="sng" algn="ctr">
+                      <a:solidFill>
+                        <a:srgbClr val="A2A9B1"/>
+                      </a:solidFill>
+                      <a:prstDash val="solid"/>
+                      <a:round/>
+                      <a:headEnd type="none" w="med" len="med"/>
+                      <a:tailEnd type="none" w="med" len="med"/>
+                    </a:lnT>
+                    <a:lnB w="9525" cap="flat" cmpd="sng" algn="ctr">
+                      <a:solidFill>
+                        <a:srgbClr val="A2A9B1"/>
+                      </a:solidFill>
+                      <a:prstDash val="solid"/>
+                      <a:round/>
+                      <a:headEnd type="none" w="med" len="med"/>
+                      <a:tailEnd type="none" w="med" len="med"/>
+                    </a:lnB>
+                    <a:solidFill>
+                      <a:srgbClr val="F8F9FA"/>
+                    </a:solidFill>
+                  </a:tcPr>
+                </a:tc>
+                <a:tc>
+                  <a:txBody>
+                    <a:bodyPr/>
+                    <a:lstStyle/>
+                    <a:p>
+                      <a:r>
+                        <a:rPr lang="en-US">
+                          <a:effectLst/>
+                        </a:rPr>
+                        <a:t>+, -</a:t>
+                      </a:r>
+                    </a:p>
+                  </a:txBody>
+                  <a:tcPr anchor="ctr">
+                    <a:lnL w="9525" cap="flat" cmpd="sng" algn="ctr">
+                      <a:solidFill>
+                        <a:srgbClr val="A2A9B1"/>
+                      </a:solidFill>
+                      <a:prstDash val="solid"/>
+                      <a:round/>
+                      <a:headEnd type="none" w="med" len="med"/>
+                      <a:tailEnd type="none" w="med" len="med"/>
+                    </a:lnL>
+                    <a:lnR w="9525" cap="flat" cmpd="sng" algn="ctr">
+                      <a:solidFill>
+                        <a:srgbClr val="A2A9B1"/>
+                      </a:solidFill>
+                      <a:prstDash val="solid"/>
+                      <a:round/>
+                      <a:headEnd type="none" w="med" len="med"/>
+                      <a:tailEnd type="none" w="med" len="med"/>
+                    </a:lnR>
+                    <a:lnT w="9525" cap="flat" cmpd="sng" algn="ctr">
+                      <a:solidFill>
+                        <a:srgbClr val="A2A9B1"/>
+                      </a:solidFill>
+                      <a:prstDash val="solid"/>
+                      <a:round/>
+                      <a:headEnd type="none" w="med" len="med"/>
+                      <a:tailEnd type="none" w="med" len="med"/>
+                    </a:lnT>
+                    <a:lnB w="9525" cap="flat" cmpd="sng" algn="ctr">
+                      <a:solidFill>
+                        <a:srgbClr val="A2A9B1"/>
+                      </a:solidFill>
+                      <a:prstDash val="solid"/>
+                      <a:round/>
+                      <a:headEnd type="none" w="med" len="med"/>
+                      <a:tailEnd type="none" w="med" len="med"/>
+                    </a:lnB>
+                    <a:solidFill>
+                      <a:srgbClr val="F8F9FA"/>
+                    </a:solidFill>
+                  </a:tcPr>
+                </a:tc>
+                <a:tc>
+                  <a:txBody>
+                    <a:bodyPr/>
+                    <a:lstStyle/>
+                    <a:p>
+                      <a:r>
+                        <a:rPr lang="en-US">
+                          <a:effectLst/>
+                        </a:rPr>
+                        <a:t>Yardstick</a:t>
+                      </a:r>
+                    </a:p>
+                  </a:txBody>
+                  <a:tcPr anchor="ctr">
+                    <a:lnL w="9525" cap="flat" cmpd="sng" algn="ctr">
+                      <a:solidFill>
+                        <a:srgbClr val="A2A9B1"/>
+                      </a:solidFill>
+                      <a:prstDash val="solid"/>
+                      <a:round/>
+                      <a:headEnd type="none" w="med" len="med"/>
+                      <a:tailEnd type="none" w="med" len="med"/>
+                    </a:lnL>
+                    <a:lnR w="9525" cap="flat" cmpd="sng" algn="ctr">
+                      <a:solidFill>
+                        <a:srgbClr val="A2A9B1"/>
+                      </a:solidFill>
+                      <a:prstDash val="solid"/>
+                      <a:round/>
+                      <a:headEnd type="none" w="med" len="med"/>
+                      <a:tailEnd type="none" w="med" len="med"/>
+                    </a:lnR>
+                    <a:lnT w="9525" cap="flat" cmpd="sng" algn="ctr">
+                      <a:solidFill>
+                        <a:srgbClr val="A2A9B1"/>
+                      </a:solidFill>
+                      <a:prstDash val="solid"/>
+                      <a:round/>
+                      <a:headEnd type="none" w="med" len="med"/>
+                      <a:tailEnd type="none" w="med" len="med"/>
+                    </a:lnT>
+                    <a:lnB w="9525" cap="flat" cmpd="sng" algn="ctr">
+                      <a:solidFill>
+                        <a:srgbClr val="A2A9B1"/>
+                      </a:solidFill>
+                      <a:prstDash val="solid"/>
+                      <a:round/>
+                      <a:headEnd type="none" w="med" len="med"/>
+                      <a:tailEnd type="none" w="med" len="med"/>
+                    </a:lnB>
+                    <a:solidFill>
+                      <a:srgbClr val="F8F9FA"/>
+                    </a:solidFill>
+                  </a:tcPr>
+                </a:tc>
+                <a:tc>
+                  <a:txBody>
+                    <a:bodyPr/>
+                    <a:lstStyle/>
+                    <a:p>
+                      <a:r>
+                        <a:rPr lang="en-US">
+                          <a:effectLst/>
+                        </a:rPr>
+                        <a:t>Mean,Deviation</a:t>
+                      </a:r>
+                    </a:p>
+                  </a:txBody>
+                  <a:tcPr anchor="ctr">
+                    <a:lnL w="9525" cap="flat" cmpd="sng" algn="ctr">
+                      <a:solidFill>
+                        <a:srgbClr val="A2A9B1"/>
+                      </a:solidFill>
+                      <a:prstDash val="solid"/>
+                      <a:round/>
+                      <a:headEnd type="none" w="med" len="med"/>
+                      <a:tailEnd type="none" w="med" len="med"/>
+                    </a:lnL>
+                    <a:lnR w="9525" cap="flat" cmpd="sng" algn="ctr">
+                      <a:solidFill>
+                        <a:srgbClr val="A2A9B1"/>
+                      </a:solidFill>
+                      <a:prstDash val="solid"/>
+                      <a:round/>
+                      <a:headEnd type="none" w="med" len="med"/>
+                      <a:tailEnd type="none" w="med" len="med"/>
+                    </a:lnR>
+                    <a:lnT w="9525" cap="flat" cmpd="sng" algn="ctr">
+                      <a:solidFill>
+                        <a:srgbClr val="A2A9B1"/>
+                      </a:solidFill>
+                      <a:prstDash val="solid"/>
+                      <a:round/>
+                      <a:headEnd type="none" w="med" len="med"/>
+                      <a:tailEnd type="none" w="med" len="med"/>
+                    </a:lnT>
+                    <a:lnB w="9525" cap="flat" cmpd="sng" algn="ctr">
+                      <a:solidFill>
+                        <a:srgbClr val="A2A9B1"/>
+                      </a:solidFill>
+                      <a:prstDash val="solid"/>
+                      <a:round/>
+                      <a:headEnd type="none" w="med" len="med"/>
+                      <a:tailEnd type="none" w="med" len="med"/>
+                    </a:lnB>
+                    <a:solidFill>
+                      <a:srgbClr val="F8F9FA"/>
+                    </a:solidFill>
+                  </a:tcPr>
+                </a:tc>
+                <a:extLst>
+                  <a:ext uri="{0D108BD9-81ED-4DB2-BD59-A6C34878D82A}">
+                    <a16:rowId xmlns:a16="http://schemas.microsoft.com/office/drawing/2014/main" val="3034572793"/>
+                  </a:ext>
+                </a:extLst>
+              </a:tr>
+              <a:tr h="0">
+                <a:tc>
+                  <a:txBody>
+                    <a:bodyPr/>
+                    <a:lstStyle/>
+                    <a:p>
+                      <a:r>
+                        <a:rPr lang="en-US">
+                          <a:effectLst/>
+                        </a:rPr>
+                        <a:t>Ratio</a:t>
+                      </a:r>
+                    </a:p>
+                  </a:txBody>
+                  <a:tcPr anchor="ctr">
+                    <a:lnL w="9525" cap="flat" cmpd="sng" algn="ctr">
+                      <a:solidFill>
+                        <a:srgbClr val="A2A9B1"/>
+                      </a:solidFill>
+                      <a:prstDash val="solid"/>
+                      <a:round/>
+                      <a:headEnd type="none" w="med" len="med"/>
+                      <a:tailEnd type="none" w="med" len="med"/>
+                    </a:lnL>
+                    <a:lnR w="9525" cap="flat" cmpd="sng" algn="ctr">
+                      <a:solidFill>
+                        <a:srgbClr val="A2A9B1"/>
+                      </a:solidFill>
+                      <a:prstDash val="solid"/>
+                      <a:round/>
+                      <a:headEnd type="none" w="med" len="med"/>
+                      <a:tailEnd type="none" w="med" len="med"/>
+                    </a:lnR>
+                    <a:lnT w="9525" cap="flat" cmpd="sng" algn="ctr">
+                      <a:solidFill>
+                        <a:srgbClr val="A2A9B1"/>
+                      </a:solidFill>
+                      <a:prstDash val="solid"/>
+                      <a:round/>
+                      <a:headEnd type="none" w="med" len="med"/>
+                      <a:tailEnd type="none" w="med" len="med"/>
+                    </a:lnT>
+                    <a:lnB w="9525" cap="flat" cmpd="sng" algn="ctr">
+                      <a:solidFill>
+                        <a:srgbClr val="A2A9B1"/>
+                      </a:solidFill>
+                      <a:prstDash val="solid"/>
+                      <a:round/>
+                      <a:headEnd type="none" w="med" len="med"/>
+                      <a:tailEnd type="none" w="med" len="med"/>
+                    </a:lnB>
+                    <a:solidFill>
+                      <a:srgbClr val="F8F9FA"/>
+                    </a:solidFill>
+                  </a:tcPr>
+                </a:tc>
+                <a:tc>
+                  <a:txBody>
+                    <a:bodyPr/>
+                    <a:lstStyle/>
+                    <a:p>
+                      <a:r>
+                        <a:rPr lang="en-US">
+                          <a:effectLst/>
+                        </a:rPr>
+                        <a:t>Magnitude, Amount</a:t>
+                      </a:r>
+                    </a:p>
+                  </a:txBody>
+                  <a:tcPr anchor="ctr">
+                    <a:lnL w="9525" cap="flat" cmpd="sng" algn="ctr">
+                      <a:solidFill>
+                        <a:srgbClr val="A2A9B1"/>
+                      </a:solidFill>
+                      <a:prstDash val="solid"/>
+                      <a:round/>
+                      <a:headEnd type="none" w="med" len="med"/>
+                      <a:tailEnd type="none" w="med" len="med"/>
+                    </a:lnL>
+                    <a:lnR w="9525" cap="flat" cmpd="sng" algn="ctr">
+                      <a:solidFill>
+                        <a:srgbClr val="A2A9B1"/>
+                      </a:solidFill>
+                      <a:prstDash val="solid"/>
+                      <a:round/>
+                      <a:headEnd type="none" w="med" len="med"/>
+                      <a:tailEnd type="none" w="med" len="med"/>
+                    </a:lnR>
+                    <a:lnT w="9525" cap="flat" cmpd="sng" algn="ctr">
+                      <a:solidFill>
+                        <a:srgbClr val="A2A9B1"/>
+                      </a:solidFill>
+                      <a:prstDash val="solid"/>
+                      <a:round/>
+                      <a:headEnd type="none" w="med" len="med"/>
+                      <a:tailEnd type="none" w="med" len="med"/>
+                    </a:lnT>
+                    <a:lnB w="9525" cap="flat" cmpd="sng" algn="ctr">
+                      <a:solidFill>
+                        <a:srgbClr val="A2A9B1"/>
+                      </a:solidFill>
+                      <a:prstDash val="solid"/>
+                      <a:round/>
+                      <a:headEnd type="none" w="med" len="med"/>
+                      <a:tailEnd type="none" w="med" len="med"/>
+                    </a:lnB>
+                    <a:solidFill>
+                      <a:srgbClr val="F8F9FA"/>
+                    </a:solidFill>
+                  </a:tcPr>
+                </a:tc>
+                <a:tc>
+                  <a:txBody>
+                    <a:bodyPr/>
+                    <a:lstStyle/>
+                    <a:p>
+                      <a:r>
+                        <a:rPr lang="en-US">
+                          <a:effectLst/>
+                        </a:rPr>
+                        <a:t>*, /</a:t>
+                      </a:r>
+                    </a:p>
+                  </a:txBody>
+                  <a:tcPr anchor="ctr">
+                    <a:lnL w="9525" cap="flat" cmpd="sng" algn="ctr">
+                      <a:solidFill>
+                        <a:srgbClr val="A2A9B1"/>
+                      </a:solidFill>
+                      <a:prstDash val="solid"/>
+                      <a:round/>
+                      <a:headEnd type="none" w="med" len="med"/>
+                      <a:tailEnd type="none" w="med" len="med"/>
+                    </a:lnL>
+                    <a:lnR w="9525" cap="flat" cmpd="sng" algn="ctr">
+                      <a:solidFill>
+                        <a:srgbClr val="A2A9B1"/>
+                      </a:solidFill>
+                      <a:prstDash val="solid"/>
+                      <a:round/>
+                      <a:headEnd type="none" w="med" len="med"/>
+                      <a:tailEnd type="none" w="med" len="med"/>
+                    </a:lnR>
+                    <a:lnT w="9525" cap="flat" cmpd="sng" algn="ctr">
+                      <a:solidFill>
+                        <a:srgbClr val="A2A9B1"/>
+                      </a:solidFill>
+                      <a:prstDash val="solid"/>
+                      <a:round/>
+                      <a:headEnd type="none" w="med" len="med"/>
+                      <a:tailEnd type="none" w="med" len="med"/>
+                    </a:lnT>
+                    <a:lnB w="9525" cap="flat" cmpd="sng" algn="ctr">
+                      <a:solidFill>
+                        <a:srgbClr val="A2A9B1"/>
+                      </a:solidFill>
+                      <a:prstDash val="solid"/>
+                      <a:round/>
+                      <a:headEnd type="none" w="med" len="med"/>
+                      <a:tailEnd type="none" w="med" len="med"/>
+                    </a:lnB>
+                    <a:solidFill>
+                      <a:srgbClr val="F8F9FA"/>
+                    </a:solidFill>
+                  </a:tcPr>
+                </a:tc>
+                <a:tc>
+                  <a:txBody>
+                    <a:bodyPr/>
+                    <a:lstStyle/>
+                    <a:p>
+                      <a:r>
+                        <a:rPr lang="en-US">
+                          <a:effectLst/>
+                        </a:rPr>
+                        <a:t>Ratio</a:t>
+                      </a:r>
+                    </a:p>
+                  </a:txBody>
+                  <a:tcPr anchor="ctr">
+                    <a:lnL w="9525" cap="flat" cmpd="sng" algn="ctr">
+                      <a:solidFill>
+                        <a:srgbClr val="A2A9B1"/>
+                      </a:solidFill>
+                      <a:prstDash val="solid"/>
+                      <a:round/>
+                      <a:headEnd type="none" w="med" len="med"/>
+                      <a:tailEnd type="none" w="med" len="med"/>
+                    </a:lnL>
+                    <a:lnR w="9525" cap="flat" cmpd="sng" algn="ctr">
+                      <a:solidFill>
+                        <a:srgbClr val="A2A9B1"/>
+                      </a:solidFill>
+                      <a:prstDash val="solid"/>
+                      <a:round/>
+                      <a:headEnd type="none" w="med" len="med"/>
+                      <a:tailEnd type="none" w="med" len="med"/>
+                    </a:lnR>
+                    <a:lnT w="9525" cap="flat" cmpd="sng" algn="ctr">
+                      <a:solidFill>
+                        <a:srgbClr val="A2A9B1"/>
+                      </a:solidFill>
+                      <a:prstDash val="solid"/>
+                      <a:round/>
+                      <a:headEnd type="none" w="med" len="med"/>
+                      <a:tailEnd type="none" w="med" len="med"/>
+                    </a:lnT>
+                    <a:lnB w="9525" cap="flat" cmpd="sng" algn="ctr">
+                      <a:solidFill>
+                        <a:srgbClr val="A2A9B1"/>
+                      </a:solidFill>
+                      <a:prstDash val="solid"/>
+                      <a:round/>
+                      <a:headEnd type="none" w="med" len="med"/>
+                      <a:tailEnd type="none" w="med" len="med"/>
+                    </a:lnB>
+                    <a:solidFill>
+                      <a:srgbClr val="F8F9FA"/>
+                    </a:solidFill>
+                  </a:tcPr>
+                </a:tc>
+                <a:tc>
+                  <a:txBody>
+                    <a:bodyPr/>
+                    <a:lstStyle/>
+                    <a:p>
+                      <a:r>
+                        <a:rPr lang="en-US">
+                          <a:effectLst/>
+                        </a:rPr>
+                        <a:t>Geometric Mean,Coeff. of Variation</a:t>
+                      </a:r>
+                    </a:p>
+                  </a:txBody>
+                  <a:tcPr anchor="ctr">
+                    <a:lnL w="9525" cap="flat" cmpd="sng" algn="ctr">
+                      <a:solidFill>
+                        <a:srgbClr val="A2A9B1"/>
+                      </a:solidFill>
+                      <a:prstDash val="solid"/>
+                      <a:round/>
+                      <a:headEnd type="none" w="med" len="med"/>
+                      <a:tailEnd type="none" w="med" len="med"/>
+                    </a:lnL>
+                    <a:lnR w="9525" cap="flat" cmpd="sng" algn="ctr">
+                      <a:solidFill>
+                        <a:srgbClr val="A2A9B1"/>
+                      </a:solidFill>
+                      <a:prstDash val="solid"/>
+                      <a:round/>
+                      <a:headEnd type="none" w="med" len="med"/>
+                      <a:tailEnd type="none" w="med" len="med"/>
+                    </a:lnR>
+                    <a:lnT w="9525" cap="flat" cmpd="sng" algn="ctr">
+                      <a:solidFill>
+                        <a:srgbClr val="A2A9B1"/>
+                      </a:solidFill>
+                      <a:prstDash val="solid"/>
+                      <a:round/>
+                      <a:headEnd type="none" w="med" len="med"/>
+                      <a:tailEnd type="none" w="med" len="med"/>
+                    </a:lnT>
+                    <a:lnB w="9525" cap="flat" cmpd="sng" algn="ctr">
+                      <a:solidFill>
+                        <a:srgbClr val="A2A9B1"/>
+                      </a:solidFill>
+                      <a:prstDash val="solid"/>
+                      <a:round/>
+                      <a:headEnd type="none" w="med" len="med"/>
+                      <a:tailEnd type="none" w="med" len="med"/>
+                    </a:lnB>
+                    <a:solidFill>
+                      <a:srgbClr val="F8F9FA"/>
+                    </a:solidFill>
+                  </a:tcPr>
+                </a:tc>
+                <a:extLst>
+                  <a:ext uri="{0D108BD9-81ED-4DB2-BD59-A6C34878D82A}">
+                    <a16:rowId xmlns:a16="http://schemas.microsoft.com/office/drawing/2014/main" val="155685584"/>
+                  </a:ext>
+                </a:extLst>
+              </a:tr>
+            </a:tbl>
+          </a:graphicData>
+        </a:graphic>
+      </p:graphicFrame>
+      <p:sp>
+        <p:nvSpPr>
+          <p:cNvPr id="5" name="Rectangle 2">
+            <a:extLst>
+              <a:ext uri="{FF2B5EF4-FFF2-40B4-BE49-F238E27FC236}">
+                <a16:creationId xmlns:a16="http://schemas.microsoft.com/office/drawing/2014/main" id="{7FE5322D-DC14-DA4C-8E76-F726177CEBBE}"/>
+              </a:ext>
+            </a:extLst>
+          </p:cNvPr>
+          <p:cNvSpPr>
+            <a:spLocks noChangeArrowheads="1"/>
+          </p:cNvSpPr>
+          <p:nvPr/>
+        </p:nvSpPr>
+        <p:spPr bwMode="auto">
+          <a:xfrm>
+            <a:off x="457200" y="2053227"/>
+            <a:ext cx="65" cy="602073"/>
+          </a:xfrm>
+          <a:prstGeom prst="rect">
+            <a:avLst/>
+          </a:prstGeom>
+          <a:noFill/>
+          <a:ln>
+            <a:noFill/>
+          </a:ln>
+          <a:effectLst/>
+          <a:extLst>
+            <a:ext uri="{909E8E84-426E-40dd-AFC4-6F175D3DCCD1}">
+              <a14:hiddenFill xmlns:a14="http://schemas.microsoft.com/office/drawing/2010/main" xmlns="">
+                <a:solidFill>
+                  <a:schemeClr val="accent1"/>
+                </a:solidFill>
+              </a14:hiddenFill>
+            </a:ext>
+            <a:ext uri="{91240B29-F687-4f45-9708-019B960494DF}">
+              <a14:hiddenLine xmlns:a14="http://schemas.microsoft.com/office/drawing/2010/main" xmlns="" w="9525">
+                <a:solidFill>
+                  <a:schemeClr val="tx1"/>
+                </a:solidFill>
+                <a:miter lim="800000"/>
+                <a:headEnd/>
+                <a:tailEnd/>
+              </a14:hiddenLine>
+            </a:ext>
+            <a:ext uri="{AF507438-7753-43e0-B8FC-AC1667EBCBE1}">
+              <a14:hiddenEffects xmlns:a14="http://schemas.microsoft.com/office/drawing/2010/main" xmlns="">
+                <a:effectLst>
+                  <a:outerShdw dist="35921" dir="2700000" algn="ctr" rotWithShape="0">
+                    <a:schemeClr val="bg2"/>
+                  </a:outerShdw>
+                </a:effectLst>
+              </a14:hiddenEffects>
+            </a:ext>
+          </a:extLst>
+        </p:spPr>
+        <p:txBody>
+          <a:bodyPr vert="horz" wrap="none" lIns="0" tIns="47610" rIns="0" bIns="0" numCol="1" anchor="ctr" anchorCtr="0" compatLnSpc="1">
+            <a:prstTxWarp prst="textNoShape">
+              <a:avLst/>
+            </a:prstTxWarp>
+            <a:spAutoFit/>
+          </a:bodyPr>
+          <a:lstStyle/>
+          <a:p>
+            <a:pPr marL="0" marR="0" lvl="0" indent="0" algn="l" defTabSz="914400" rtl="0" eaLnBrk="0" fontAlgn="base" latinLnBrk="0" hangingPunct="0">
+              <a:lnSpc>
+                <a:spcPct val="100000"/>
+              </a:lnSpc>
+              <a:spcBef>
+                <a:spcPct val="0"/>
+              </a:spcBef>
+              <a:spcAft>
+                <a:spcPct val="0"/>
+              </a:spcAft>
+              <a:buClrTx/>
+              <a:buSzTx/>
+              <a:buFontTx/>
+              <a:buNone/>
+              <a:tabLst/>
+            </a:pPr>
+            <a:endParaRPr kumimoji="0" lang="en-US" altLang="en-US" sz="1000" b="1" i="0" u="none" strike="noStrike" cap="none" normalizeH="0" baseline="0" dirty="0">
+              <a:ln>
+                <a:noFill/>
+              </a:ln>
+              <a:solidFill>
+                <a:srgbClr val="000000"/>
+              </a:solidFill>
+              <a:effectLst/>
+              <a:latin typeface="Arial" panose="020B0604020202020204" pitchFamily="34" charset="0"/>
+            </a:endParaRPr>
+          </a:p>
+          <a:p>
+            <a:pPr marL="0" marR="0" lvl="0" indent="0" algn="l" defTabSz="914400" rtl="0" eaLnBrk="0" fontAlgn="base" latinLnBrk="0" hangingPunct="0">
+              <a:lnSpc>
+                <a:spcPct val="100000"/>
+              </a:lnSpc>
+              <a:spcBef>
+                <a:spcPct val="0"/>
+              </a:spcBef>
+              <a:spcAft>
+                <a:spcPct val="0"/>
+              </a:spcAft>
+              <a:buClrTx/>
+              <a:buSzTx/>
+              <a:buFontTx/>
+              <a:buNone/>
+              <a:tabLst/>
+            </a:pPr>
+            <a:br>
+              <a:rPr kumimoji="0" lang="en-US" altLang="en-US" sz="800" b="0" i="0" u="none" strike="noStrike" cap="none" normalizeH="0" baseline="0" dirty="0">
+                <a:ln>
+                  <a:noFill/>
+                </a:ln>
+                <a:solidFill>
+                  <a:schemeClr val="tx1"/>
+                </a:solidFill>
+                <a:effectLst/>
+              </a:rPr>
+            </a:br>
+            <a:endParaRPr kumimoji="0" lang="en-US" altLang="en-US" sz="1800" b="0" i="0" u="none" strike="noStrike" cap="none" normalizeH="0" baseline="0" dirty="0">
+              <a:ln>
+                <a:noFill/>
+              </a:ln>
+              <a:solidFill>
+                <a:schemeClr val="tx1"/>
+              </a:solidFill>
+              <a:effectLst/>
+              <a:latin typeface="Arial" panose="020B0604020202020204" pitchFamily="34" charset="0"/>
+            </a:endParaRPr>
+          </a:p>
+        </p:txBody>
+      </p:sp>
+      <p:sp>
+        <p:nvSpPr>
+          <p:cNvPr id="6" name="TextBox 5">
+            <a:extLst>
+              <a:ext uri="{FF2B5EF4-FFF2-40B4-BE49-F238E27FC236}">
+                <a16:creationId xmlns:a16="http://schemas.microsoft.com/office/drawing/2014/main" id="{0115B77C-A84D-C44D-BE7D-91573F247ADA}"/>
+              </a:ext>
+            </a:extLst>
+          </p:cNvPr>
+          <p:cNvSpPr txBox="1"/>
+          <p:nvPr/>
+        </p:nvSpPr>
+        <p:spPr>
+          <a:xfrm>
+            <a:off x="609600" y="5943600"/>
+            <a:ext cx="8382000" cy="646331"/>
+          </a:xfrm>
+          <a:prstGeom prst="rect">
+            <a:avLst/>
+          </a:prstGeom>
+          <a:noFill/>
+        </p:spPr>
+        <p:txBody>
+          <a:bodyPr wrap="square" rtlCol="0">
+            <a:spAutoFit/>
+          </a:bodyPr>
+          <a:lstStyle/>
+          <a:p>
+            <a:r>
+              <a:rPr lang="en-US" dirty="0"/>
+              <a:t>Source: https://</a:t>
+            </a:r>
+            <a:r>
+              <a:rPr lang="en-US" dirty="0" err="1"/>
+              <a:t>en.wikipedia.org</a:t>
+            </a:r>
+            <a:r>
+              <a:rPr lang="en-US" dirty="0"/>
+              <a:t>/wiki/</a:t>
+            </a:r>
+            <a:r>
+              <a:rPr lang="en-US" dirty="0" err="1"/>
+              <a:t>Level_of_measurement</a:t>
+            </a:r>
+            <a:endParaRPr lang="en-US" dirty="0"/>
+          </a:p>
+          <a:p>
+            <a:endParaRPr lang="en-US" dirty="0"/>
+          </a:p>
+        </p:txBody>
+      </p:sp>
+      <p:sp>
+        <p:nvSpPr>
+          <p:cNvPr id="7" name="TextBox 6">
+            <a:extLst>
+              <a:ext uri="{FF2B5EF4-FFF2-40B4-BE49-F238E27FC236}">
+                <a16:creationId xmlns:a16="http://schemas.microsoft.com/office/drawing/2014/main" id="{42662E6C-BF82-4A45-B047-DE0A8335A90C}"/>
+              </a:ext>
+            </a:extLst>
+          </p:cNvPr>
+          <p:cNvSpPr txBox="1"/>
+          <p:nvPr/>
+        </p:nvSpPr>
+        <p:spPr>
+          <a:xfrm>
+            <a:off x="228600" y="1295400"/>
+            <a:ext cx="5181600" cy="707886"/>
+          </a:xfrm>
+          <a:prstGeom prst="rect">
+            <a:avLst/>
+          </a:prstGeom>
+          <a:noFill/>
+        </p:spPr>
+        <p:txBody>
+          <a:bodyPr wrap="square" rtlCol="0">
+            <a:spAutoFit/>
+          </a:bodyPr>
+          <a:lstStyle/>
+          <a:p>
+            <a:r>
+              <a:rPr lang="en-US" sz="4000" b="1" dirty="0"/>
+              <a:t>Level of measurement</a:t>
+            </a:r>
+          </a:p>
+        </p:txBody>
+      </p:sp>
+    </p:spTree>
+    <p:extLst>
+      <p:ext uri="{BB962C8B-B14F-4D97-AF65-F5344CB8AC3E}">
+        <p14:creationId xmlns:p14="http://schemas.microsoft.com/office/powerpoint/2010/main" val="3790979021"/>
+      </p:ext>
+    </p:extLst>
+  </p:cSld>
+  <p:clrMapOvr>
+    <a:masterClrMapping/>
+  </p:clrMapOvr>
+</p:sld>
+</file>
+
+<file path=ppt/slides/slide41.xml><?xml version="1.0" encoding="utf-8"?>
+<p:sld xmlns:a="http://schemas.openxmlformats.org/drawingml/2006/main" xmlns:r="http://schemas.openxmlformats.org/officeDocument/2006/relationships" xmlns:p="http://schemas.openxmlformats.org/presentationml/2006/main">
+  <p:cSld>
+    <p:spTree>
+      <p:nvGrpSpPr>
+        <p:cNvPr id="1" name=""/>
+        <p:cNvGrpSpPr/>
+        <p:nvPr/>
+      </p:nvGrpSpPr>
+      <p:grpSpPr>
+        <a:xfrm>
+          <a:off x="0" y="0"/>
+          <a:ext cx="0" cy="0"/>
+          <a:chOff x="0" y="0"/>
+          <a:chExt cx="0" cy="0"/>
+        </a:xfrm>
+      </p:grpSpPr>
+      <p:pic>
+        <p:nvPicPr>
+          <p:cNvPr id="5" name="Picture 4">
+            <a:extLst>
+              <a:ext uri="{FF2B5EF4-FFF2-40B4-BE49-F238E27FC236}">
+                <a16:creationId xmlns:a16="http://schemas.microsoft.com/office/drawing/2014/main" id="{C8090CFA-32EC-8C46-B2C4-F206F379DEB5}"/>
+              </a:ext>
+            </a:extLst>
+          </p:cNvPr>
+          <p:cNvPicPr>
+            <a:picLocks noChangeAspect="1"/>
+          </p:cNvPicPr>
+          <p:nvPr/>
+        </p:nvPicPr>
+        <p:blipFill>
+          <a:blip r:embed="rId3">
+            <a:extLst>
+              <a:ext uri="{28A0092B-C50C-407E-A947-70E740481C1C}">
+                <a14:useLocalDpi xmlns:a14="http://schemas.microsoft.com/office/drawing/2010/main" val="0"/>
+              </a:ext>
+            </a:extLst>
+          </a:blip>
+          <a:stretch>
+            <a:fillRect/>
+          </a:stretch>
+        </p:blipFill>
+        <p:spPr>
+          <a:xfrm>
+            <a:off x="419100" y="2003286"/>
+            <a:ext cx="8258746" cy="4397514"/>
+          </a:xfrm>
+          <a:prstGeom prst="rect">
+            <a:avLst/>
+          </a:prstGeom>
+        </p:spPr>
+      </p:pic>
+      <p:sp>
+        <p:nvSpPr>
+          <p:cNvPr id="8" name="Title 1">
+            <a:extLst>
+              <a:ext uri="{FF2B5EF4-FFF2-40B4-BE49-F238E27FC236}">
+                <a16:creationId xmlns:a16="http://schemas.microsoft.com/office/drawing/2014/main" id="{5450EDB0-A943-994F-B91C-DE78772B53DD}"/>
+              </a:ext>
+            </a:extLst>
+          </p:cNvPr>
+          <p:cNvSpPr>
+            <a:spLocks noGrp="1"/>
+          </p:cNvSpPr>
+          <p:nvPr>
+            <p:ph type="title"/>
+          </p:nvPr>
+        </p:nvSpPr>
+        <p:spPr>
+          <a:xfrm>
+            <a:off x="457200" y="274638"/>
+            <a:ext cx="8229600" cy="1143000"/>
+          </a:xfrm>
+        </p:spPr>
+        <p:txBody>
+          <a:bodyPr/>
+          <a:lstStyle/>
+          <a:p>
+            <a:r>
+              <a:rPr lang="en-US" dirty="0"/>
+              <a:t>Summary of Knowledge</a:t>
+            </a:r>
+          </a:p>
+        </p:txBody>
+      </p:sp>
+      <p:sp>
+        <p:nvSpPr>
+          <p:cNvPr id="9" name="TextBox 8">
+            <a:extLst>
+              <a:ext uri="{FF2B5EF4-FFF2-40B4-BE49-F238E27FC236}">
+                <a16:creationId xmlns:a16="http://schemas.microsoft.com/office/drawing/2014/main" id="{4223E6F6-9A1B-0848-96E2-7F409BB4A322}"/>
+              </a:ext>
+            </a:extLst>
+          </p:cNvPr>
+          <p:cNvSpPr txBox="1"/>
+          <p:nvPr/>
+        </p:nvSpPr>
+        <p:spPr>
+          <a:xfrm>
+            <a:off x="228600" y="1295400"/>
+            <a:ext cx="5181600" cy="707886"/>
+          </a:xfrm>
+          <a:prstGeom prst="rect">
+            <a:avLst/>
+          </a:prstGeom>
+          <a:noFill/>
+        </p:spPr>
+        <p:txBody>
+          <a:bodyPr wrap="square" rtlCol="0">
+            <a:spAutoFit/>
+          </a:bodyPr>
+          <a:lstStyle/>
+          <a:p>
+            <a:r>
+              <a:rPr lang="en-US" sz="4000" b="1" dirty="0"/>
+              <a:t>Level of measurement</a:t>
+            </a:r>
+          </a:p>
+        </p:txBody>
+      </p:sp>
+    </p:spTree>
+    <p:extLst>
+      <p:ext uri="{BB962C8B-B14F-4D97-AF65-F5344CB8AC3E}">
+        <p14:creationId xmlns:p14="http://schemas.microsoft.com/office/powerpoint/2010/main" val="4051268181"/>
+      </p:ext>
+    </p:extLst>
+  </p:cSld>
+  <p:clrMapOvr>
+    <a:masterClrMapping/>
+  </p:clrMapOvr>
+</p:sld>
+</file>
+
+<file path=ppt/slides/slide42.xml><?xml version="1.0" encoding="utf-8"?>
+<p:sld xmlns:a="http://schemas.openxmlformats.org/drawingml/2006/main" xmlns:r="http://schemas.openxmlformats.org/officeDocument/2006/relationships" xmlns:p="http://schemas.openxmlformats.org/presentationml/2006/main">
+  <p:cSld>
+    <p:spTree>
+      <p:nvGrpSpPr>
+        <p:cNvPr id="1" name=""/>
+        <p:cNvGrpSpPr/>
+        <p:nvPr/>
+      </p:nvGrpSpPr>
+      <p:grpSpPr>
+        <a:xfrm>
+          <a:off x="0" y="0"/>
+          <a:ext cx="0" cy="0"/>
+          <a:chOff x="0" y="0"/>
+          <a:chExt cx="0" cy="0"/>
+        </a:xfrm>
+      </p:grpSpPr>
+      <p:sp>
+        <p:nvSpPr>
+          <p:cNvPr id="2" name="Title 1"/>
+          <p:cNvSpPr>
+            <a:spLocks noGrp="1"/>
+          </p:cNvSpPr>
+          <p:nvPr>
+            <p:ph type="title"/>
+          </p:nvPr>
+        </p:nvSpPr>
+        <p:spPr/>
+        <p:txBody>
+          <a:bodyPr>
+            <a:normAutofit/>
+          </a:bodyPr>
+          <a:lstStyle/>
+          <a:p>
+            <a:r>
+              <a:rPr lang="en-US" b="1" dirty="0">
+                <a:solidFill>
+                  <a:srgbClr val="000099"/>
+                </a:solidFill>
+                <a:latin typeface="Palatino Linotype" pitchFamily="18" charset="0"/>
+                <a:ea typeface="Cambria Math" pitchFamily="18" charset="0"/>
+              </a:rPr>
+              <a:t>Summation notation </a:t>
+            </a:r>
+          </a:p>
+        </p:txBody>
+      </p:sp>
+      <p:sp>
+        <p:nvSpPr>
+          <p:cNvPr id="3" name="Content Placeholder 2"/>
+          <p:cNvSpPr>
+            <a:spLocks noGrp="1"/>
+          </p:cNvSpPr>
+          <p:nvPr>
+            <p:ph idx="1"/>
+          </p:nvPr>
+        </p:nvSpPr>
+        <p:spPr/>
+        <p:txBody>
+          <a:bodyPr>
+            <a:normAutofit fontScale="85000" lnSpcReduction="20000"/>
+          </a:bodyPr>
+          <a:lstStyle/>
+          <a:p>
+            <a:r>
+              <a:rPr lang="en-US" altLang="zh-Hans" dirty="0">
+                <a:latin typeface="Palatino Linotype" pitchFamily="18" charset="0"/>
+              </a:rPr>
+              <a:t>Population</a:t>
+            </a:r>
+          </a:p>
+          <a:p>
+            <a:r>
+              <a:rPr lang="en-US" altLang="zh-Hans" dirty="0">
+                <a:latin typeface="Palatino Linotype" pitchFamily="18" charset="0"/>
+              </a:rPr>
+              <a:t>Sample</a:t>
+            </a:r>
+          </a:p>
+          <a:p>
+            <a:r>
+              <a:rPr lang="en-US" altLang="zh-Hans" dirty="0">
+                <a:latin typeface="Palatino Linotype" pitchFamily="18" charset="0"/>
+              </a:rPr>
+              <a:t>Variable</a:t>
+            </a:r>
+          </a:p>
+          <a:p>
+            <a:pPr lvl="1"/>
+            <a:r>
+              <a:rPr lang="en-US" altLang="zh-Hans" dirty="0">
+                <a:latin typeface="Palatino Linotype" pitchFamily="18" charset="0"/>
+              </a:rPr>
+              <a:t>Independent</a:t>
+            </a:r>
+            <a:r>
+              <a:rPr lang="zh-Hans" altLang="en-US" dirty="0">
+                <a:latin typeface="Palatino Linotype" pitchFamily="18" charset="0"/>
+              </a:rPr>
+              <a:t> </a:t>
+            </a:r>
+            <a:r>
+              <a:rPr lang="en-US" altLang="zh-Hans" dirty="0">
+                <a:latin typeface="Palatino Linotype" pitchFamily="18" charset="0"/>
+              </a:rPr>
+              <a:t>variable</a:t>
+            </a:r>
+          </a:p>
+          <a:p>
+            <a:pPr lvl="1"/>
+            <a:r>
+              <a:rPr lang="en-US" altLang="zh-Hans" dirty="0">
+                <a:latin typeface="Palatino Linotype" pitchFamily="18" charset="0"/>
+              </a:rPr>
+              <a:t>Dependent</a:t>
+            </a:r>
+            <a:r>
+              <a:rPr lang="zh-Hans" altLang="en-US" dirty="0">
+                <a:latin typeface="Palatino Linotype" pitchFamily="18" charset="0"/>
+              </a:rPr>
+              <a:t> </a:t>
+            </a:r>
+            <a:r>
+              <a:rPr lang="en-US" altLang="zh-Hans" dirty="0">
+                <a:latin typeface="Palatino Linotype" pitchFamily="18" charset="0"/>
+              </a:rPr>
+              <a:t>variable</a:t>
+            </a:r>
+          </a:p>
+          <a:p>
+            <a:r>
+              <a:rPr lang="en-US" altLang="zh-Hans" dirty="0">
+                <a:latin typeface="Palatino Linotype" pitchFamily="18" charset="0"/>
+              </a:rPr>
+              <a:t>Data</a:t>
+            </a:r>
+          </a:p>
+          <a:p>
+            <a:pPr lvl="1"/>
+            <a:r>
+              <a:rPr lang="en-US" altLang="zh-Hans" dirty="0">
+                <a:latin typeface="Palatino Linotype" pitchFamily="18" charset="0"/>
+              </a:rPr>
+              <a:t>Nominal</a:t>
+            </a:r>
+          </a:p>
+          <a:p>
+            <a:pPr lvl="1"/>
+            <a:r>
+              <a:rPr lang="en-US" altLang="zh-Hans" dirty="0">
+                <a:latin typeface="Palatino Linotype" pitchFamily="18" charset="0"/>
+              </a:rPr>
+              <a:t>Ordinal</a:t>
+            </a:r>
+          </a:p>
+          <a:p>
+            <a:pPr lvl="1"/>
+            <a:r>
+              <a:rPr lang="en-US" altLang="zh-Hans" dirty="0">
+                <a:latin typeface="Palatino Linotype" pitchFamily="18" charset="0"/>
+              </a:rPr>
+              <a:t>Interval</a:t>
+            </a:r>
+          </a:p>
+          <a:p>
+            <a:pPr lvl="1"/>
+            <a:r>
+              <a:rPr lang="en-US" altLang="zh-Hans" dirty="0">
+                <a:latin typeface="Palatino Linotype" pitchFamily="18" charset="0"/>
+              </a:rPr>
+              <a:t>Ratio</a:t>
+            </a:r>
+          </a:p>
+          <a:p>
+            <a:r>
+              <a:rPr lang="en-US" dirty="0">
+                <a:latin typeface="Palatino Linotype" pitchFamily="18" charset="0"/>
+              </a:rPr>
+              <a:t>Descriptive vs. Inferential</a:t>
+            </a:r>
+            <a:r>
+              <a:rPr lang="zh-Hans" altLang="en-US" dirty="0">
+                <a:latin typeface="Palatino Linotype" pitchFamily="18" charset="0"/>
+              </a:rPr>
+              <a:t> </a:t>
+            </a:r>
+            <a:r>
+              <a:rPr lang="en-US" altLang="zh-Hans" dirty="0">
+                <a:latin typeface="Palatino Linotype" pitchFamily="18" charset="0"/>
+              </a:rPr>
+              <a:t>Statistics</a:t>
+            </a:r>
+            <a:endParaRPr lang="en-US" dirty="0">
+              <a:latin typeface="Palatino Linotype" pitchFamily="18" charset="0"/>
+            </a:endParaRPr>
+          </a:p>
+        </p:txBody>
+      </p:sp>
+      <p:sp>
+        <p:nvSpPr>
+          <p:cNvPr id="4" name="Slide Number Placeholder 3"/>
+          <p:cNvSpPr>
+            <a:spLocks noGrp="1"/>
+          </p:cNvSpPr>
+          <p:nvPr>
+            <p:ph type="sldNum" sz="quarter" idx="12"/>
+          </p:nvPr>
+        </p:nvSpPr>
+        <p:spPr/>
+        <p:txBody>
+          <a:bodyPr/>
+          <a:lstStyle/>
+          <a:p>
+            <a:fld id="{DF25E0C8-8CAD-4BA8-80F3-7765EFC7DE86}" type="slidenum">
+              <a:rPr lang="en-US" smtClean="0"/>
+              <a:pPr/>
+              <a:t>42</a:t>
+            </a:fld>
+            <a:endParaRPr lang="en-US"/>
+          </a:p>
+        </p:txBody>
+      </p:sp>
+    </p:spTree>
+    <p:extLst>
+      <p:ext uri="{BB962C8B-B14F-4D97-AF65-F5344CB8AC3E}">
+        <p14:creationId xmlns:p14="http://schemas.microsoft.com/office/powerpoint/2010/main" val="2851858392"/>
+      </p:ext>
+    </p:extLst>
+  </p:cSld>
+  <p:clrMapOvr>
+    <a:masterClrMapping/>
+  </p:clrMapOvr>
 </p:sld>
 </file>
 

</xml_diff>